<commit_message>
playing with gamma and popGenome issues
</commit_message>
<xml_diff>
--- a/simulation thoughts.pptx
+++ b/simulation thoughts.pptx
@@ -13,6 +13,7 @@
     <p:sldId id="260" r:id="rId7"/>
     <p:sldId id="258" r:id="rId8"/>
     <p:sldId id="263" r:id="rId9"/>
+    <p:sldId id="264" r:id="rId10"/>
   </p:sldIdLst>
   <p:sldSz cx="9144000" cy="6858000" type="screen4x3"/>
   <p:notesSz cx="6858000" cy="9144000"/>
@@ -295,7 +296,7 @@
           <a:p>
             <a:fld id="{F4EBF145-DA63-42BF-AC08-4F1ED58EAB64}" type="datetimeFigureOut">
               <a:rPr lang="en-US" smtClean="0"/>
-              <a:t>4/15/2015</a:t>
+              <a:t>4/16/2015</a:t>
             </a:fld>
             <a:endParaRPr lang="en-US"/>
           </a:p>
@@ -465,7 +466,7 @@
           <a:p>
             <a:fld id="{F4EBF145-DA63-42BF-AC08-4F1ED58EAB64}" type="datetimeFigureOut">
               <a:rPr lang="en-US" smtClean="0"/>
-              <a:t>4/15/2015</a:t>
+              <a:t>4/16/2015</a:t>
             </a:fld>
             <a:endParaRPr lang="en-US"/>
           </a:p>
@@ -645,7 +646,7 @@
           <a:p>
             <a:fld id="{F4EBF145-DA63-42BF-AC08-4F1ED58EAB64}" type="datetimeFigureOut">
               <a:rPr lang="en-US" smtClean="0"/>
-              <a:t>4/15/2015</a:t>
+              <a:t>4/16/2015</a:t>
             </a:fld>
             <a:endParaRPr lang="en-US"/>
           </a:p>
@@ -815,7 +816,7 @@
           <a:p>
             <a:fld id="{F4EBF145-DA63-42BF-AC08-4F1ED58EAB64}" type="datetimeFigureOut">
               <a:rPr lang="en-US" smtClean="0"/>
-              <a:t>4/15/2015</a:t>
+              <a:t>4/16/2015</a:t>
             </a:fld>
             <a:endParaRPr lang="en-US"/>
           </a:p>
@@ -1061,7 +1062,7 @@
           <a:p>
             <a:fld id="{F4EBF145-DA63-42BF-AC08-4F1ED58EAB64}" type="datetimeFigureOut">
               <a:rPr lang="en-US" smtClean="0"/>
-              <a:t>4/15/2015</a:t>
+              <a:t>4/16/2015</a:t>
             </a:fld>
             <a:endParaRPr lang="en-US"/>
           </a:p>
@@ -1349,7 +1350,7 @@
           <a:p>
             <a:fld id="{F4EBF145-DA63-42BF-AC08-4F1ED58EAB64}" type="datetimeFigureOut">
               <a:rPr lang="en-US" smtClean="0"/>
-              <a:t>4/15/2015</a:t>
+              <a:t>4/16/2015</a:t>
             </a:fld>
             <a:endParaRPr lang="en-US"/>
           </a:p>
@@ -1771,7 +1772,7 @@
           <a:p>
             <a:fld id="{F4EBF145-DA63-42BF-AC08-4F1ED58EAB64}" type="datetimeFigureOut">
               <a:rPr lang="en-US" smtClean="0"/>
-              <a:t>4/15/2015</a:t>
+              <a:t>4/16/2015</a:t>
             </a:fld>
             <a:endParaRPr lang="en-US"/>
           </a:p>
@@ -1889,7 +1890,7 @@
           <a:p>
             <a:fld id="{F4EBF145-DA63-42BF-AC08-4F1ED58EAB64}" type="datetimeFigureOut">
               <a:rPr lang="en-US" smtClean="0"/>
-              <a:t>4/15/2015</a:t>
+              <a:t>4/16/2015</a:t>
             </a:fld>
             <a:endParaRPr lang="en-US"/>
           </a:p>
@@ -1984,7 +1985,7 @@
           <a:p>
             <a:fld id="{F4EBF145-DA63-42BF-AC08-4F1ED58EAB64}" type="datetimeFigureOut">
               <a:rPr lang="en-US" smtClean="0"/>
-              <a:t>4/15/2015</a:t>
+              <a:t>4/16/2015</a:t>
             </a:fld>
             <a:endParaRPr lang="en-US"/>
           </a:p>
@@ -2261,7 +2262,7 @@
           <a:p>
             <a:fld id="{F4EBF145-DA63-42BF-AC08-4F1ED58EAB64}" type="datetimeFigureOut">
               <a:rPr lang="en-US" smtClean="0"/>
-              <a:t>4/15/2015</a:t>
+              <a:t>4/16/2015</a:t>
             </a:fld>
             <a:endParaRPr lang="en-US"/>
           </a:p>
@@ -2514,7 +2515,7 @@
           <a:p>
             <a:fld id="{F4EBF145-DA63-42BF-AC08-4F1ED58EAB64}" type="datetimeFigureOut">
               <a:rPr lang="en-US" smtClean="0"/>
-              <a:t>4/15/2015</a:t>
+              <a:t>4/16/2015</a:t>
             </a:fld>
             <a:endParaRPr lang="en-US"/>
           </a:p>
@@ -2727,7 +2728,7 @@
           <a:p>
             <a:fld id="{F4EBF145-DA63-42BF-AC08-4F1ED58EAB64}" type="datetimeFigureOut">
               <a:rPr lang="en-US" smtClean="0"/>
-              <a:t>4/15/2015</a:t>
+              <a:t>4/16/2015</a:t>
             </a:fld>
             <a:endParaRPr lang="en-US"/>
           </a:p>
@@ -3142,7 +3143,11 @@
           <a:p>
             <a:r>
               <a:rPr lang="en-US" dirty="0" smtClean="0"/>
-              <a:t>To have a record of things we tried</a:t>
+              <a:t>To have a record of things we </a:t>
+            </a:r>
+            <a:r>
+              <a:rPr lang="en-US" dirty="0" smtClean="0"/>
+              <a:t>tried, or funny things with the code</a:t>
             </a:r>
             <a:endParaRPr lang="en-US" dirty="0"/>
           </a:p>
@@ -4449,6 +4454,1918 @@
     <p:extLst>
       <p:ext uri="{BB962C8B-B14F-4D97-AF65-F5344CB8AC3E}">
         <p14:creationId xmlns:p14="http://schemas.microsoft.com/office/powerpoint/2010/main" val="3486226668"/>
+      </p:ext>
+    </p:extLst>
+  </p:cSld>
+  <p:clrMapOvr>
+    <a:masterClrMapping/>
+  </p:clrMapOvr>
+</p:sld>
+</file>
+
+<file path=ppt/slides/slide9.xml><?xml version="1.0" encoding="utf-8"?>
+<p:sld xmlns:a="http://schemas.openxmlformats.org/drawingml/2006/main" xmlns:r="http://schemas.openxmlformats.org/officeDocument/2006/relationships" xmlns:p="http://schemas.openxmlformats.org/presentationml/2006/main">
+  <p:cSld>
+    <p:spTree>
+      <p:nvGrpSpPr>
+        <p:cNvPr id="1" name=""/>
+        <p:cNvGrpSpPr/>
+        <p:nvPr/>
+      </p:nvGrpSpPr>
+      <p:grpSpPr>
+        <a:xfrm>
+          <a:off x="0" y="0"/>
+          <a:ext cx="0" cy="0"/>
+          <a:chOff x="0" y="0"/>
+          <a:chExt cx="0" cy="0"/>
+        </a:xfrm>
+      </p:grpSpPr>
+      <p:sp>
+        <p:nvSpPr>
+          <p:cNvPr id="2" name="Rectangle 1"/>
+          <p:cNvSpPr>
+            <a:spLocks noChangeArrowheads="1"/>
+          </p:cNvSpPr>
+          <p:nvPr/>
+        </p:nvSpPr>
+        <p:spPr bwMode="auto">
+          <a:xfrm>
+            <a:off x="827584" y="1380832"/>
+            <a:ext cx="4752528" cy="3508653"/>
+          </a:xfrm>
+          <a:prstGeom prst="rect">
+            <a:avLst/>
+          </a:prstGeom>
+          <a:solidFill>
+            <a:srgbClr val="1D1F21"/>
+          </a:solidFill>
+          <a:ln>
+            <a:noFill/>
+          </a:ln>
+          <a:effectLst/>
+          <a:extLst>
+            <a:ext uri="{91240B29-F687-4F45-9708-019B960494DF}">
+              <a14:hiddenLine xmlns:a14="http://schemas.microsoft.com/office/drawing/2010/main" w="9525">
+                <a:solidFill>
+                  <a:schemeClr val="tx1"/>
+                </a:solidFill>
+                <a:miter lim="800000"/>
+                <a:headEnd/>
+                <a:tailEnd/>
+              </a14:hiddenLine>
+            </a:ext>
+            <a:ext uri="{AF507438-7753-43E0-B8FC-AC1667EBCBE1}">
+              <a14:hiddenEffects xmlns:a14="http://schemas.microsoft.com/office/drawing/2010/main">
+                <a:effectLst>
+                  <a:outerShdw dist="35921" dir="2700000" algn="ctr" rotWithShape="0">
+                    <a:schemeClr val="bg2"/>
+                  </a:outerShdw>
+                </a:effectLst>
+              </a14:hiddenEffects>
+            </a:ext>
+          </a:extLst>
+        </p:spPr>
+        <p:txBody>
+          <a:bodyPr vert="horz" wrap="square" lIns="0" tIns="0" rIns="0" bIns="0" numCol="1" anchor="ctr" anchorCtr="0" compatLnSpc="1">
+            <a:prstTxWarp prst="textNoShape">
+              <a:avLst/>
+            </a:prstTxWarp>
+            <a:spAutoFit/>
+          </a:bodyPr>
+          <a:lstStyle>
+            <a:lvl1pPr fontAlgn="base">
+              <a:spcBef>
+                <a:spcPct val="0"/>
+              </a:spcBef>
+              <a:spcAft>
+                <a:spcPct val="0"/>
+              </a:spcAft>
+              <a:defRPr>
+                <a:solidFill>
+                  <a:schemeClr val="tx1"/>
+                </a:solidFill>
+                <a:latin typeface="Arial" pitchFamily="34" charset="0"/>
+                <a:cs typeface="Arial" pitchFamily="34" charset="0"/>
+              </a:defRPr>
+            </a:lvl1pPr>
+            <a:lvl2pPr fontAlgn="base">
+              <a:spcBef>
+                <a:spcPct val="0"/>
+              </a:spcBef>
+              <a:spcAft>
+                <a:spcPct val="0"/>
+              </a:spcAft>
+              <a:defRPr>
+                <a:solidFill>
+                  <a:schemeClr val="tx1"/>
+                </a:solidFill>
+                <a:latin typeface="Arial" pitchFamily="34" charset="0"/>
+                <a:cs typeface="Arial" pitchFamily="34" charset="0"/>
+              </a:defRPr>
+            </a:lvl2pPr>
+            <a:lvl3pPr fontAlgn="base">
+              <a:spcBef>
+                <a:spcPct val="0"/>
+              </a:spcBef>
+              <a:spcAft>
+                <a:spcPct val="0"/>
+              </a:spcAft>
+              <a:defRPr>
+                <a:solidFill>
+                  <a:schemeClr val="tx1"/>
+                </a:solidFill>
+                <a:latin typeface="Arial" pitchFamily="34" charset="0"/>
+                <a:cs typeface="Arial" pitchFamily="34" charset="0"/>
+              </a:defRPr>
+            </a:lvl3pPr>
+            <a:lvl4pPr fontAlgn="base">
+              <a:spcBef>
+                <a:spcPct val="0"/>
+              </a:spcBef>
+              <a:spcAft>
+                <a:spcPct val="0"/>
+              </a:spcAft>
+              <a:defRPr>
+                <a:solidFill>
+                  <a:schemeClr val="tx1"/>
+                </a:solidFill>
+                <a:latin typeface="Arial" pitchFamily="34" charset="0"/>
+                <a:cs typeface="Arial" pitchFamily="34" charset="0"/>
+              </a:defRPr>
+            </a:lvl4pPr>
+            <a:lvl5pPr fontAlgn="base">
+              <a:spcBef>
+                <a:spcPct val="0"/>
+              </a:spcBef>
+              <a:spcAft>
+                <a:spcPct val="0"/>
+              </a:spcAft>
+              <a:defRPr>
+                <a:solidFill>
+                  <a:schemeClr val="tx1"/>
+                </a:solidFill>
+                <a:latin typeface="Arial" pitchFamily="34" charset="0"/>
+                <a:cs typeface="Arial" pitchFamily="34" charset="0"/>
+              </a:defRPr>
+            </a:lvl5pPr>
+            <a:lvl6pPr fontAlgn="base">
+              <a:spcBef>
+                <a:spcPct val="0"/>
+              </a:spcBef>
+              <a:spcAft>
+                <a:spcPct val="0"/>
+              </a:spcAft>
+              <a:defRPr>
+                <a:solidFill>
+                  <a:schemeClr val="tx1"/>
+                </a:solidFill>
+                <a:latin typeface="Arial" pitchFamily="34" charset="0"/>
+                <a:cs typeface="Arial" pitchFamily="34" charset="0"/>
+              </a:defRPr>
+            </a:lvl6pPr>
+            <a:lvl7pPr fontAlgn="base">
+              <a:spcBef>
+                <a:spcPct val="0"/>
+              </a:spcBef>
+              <a:spcAft>
+                <a:spcPct val="0"/>
+              </a:spcAft>
+              <a:defRPr>
+                <a:solidFill>
+                  <a:schemeClr val="tx1"/>
+                </a:solidFill>
+                <a:latin typeface="Arial" pitchFamily="34" charset="0"/>
+                <a:cs typeface="Arial" pitchFamily="34" charset="0"/>
+              </a:defRPr>
+            </a:lvl7pPr>
+            <a:lvl8pPr fontAlgn="base">
+              <a:spcBef>
+                <a:spcPct val="0"/>
+              </a:spcBef>
+              <a:spcAft>
+                <a:spcPct val="0"/>
+              </a:spcAft>
+              <a:defRPr>
+                <a:solidFill>
+                  <a:schemeClr val="tx1"/>
+                </a:solidFill>
+                <a:latin typeface="Arial" pitchFamily="34" charset="0"/>
+                <a:cs typeface="Arial" pitchFamily="34" charset="0"/>
+              </a:defRPr>
+            </a:lvl8pPr>
+            <a:lvl9pPr fontAlgn="base">
+              <a:spcBef>
+                <a:spcPct val="0"/>
+              </a:spcBef>
+              <a:spcAft>
+                <a:spcPct val="0"/>
+              </a:spcAft>
+              <a:defRPr>
+                <a:solidFill>
+                  <a:schemeClr val="tx1"/>
+                </a:solidFill>
+                <a:latin typeface="Arial" pitchFamily="34" charset="0"/>
+                <a:cs typeface="Arial" pitchFamily="34" charset="0"/>
+              </a:defRPr>
+            </a:lvl9pPr>
+          </a:lstStyle>
+          <a:p>
+            <a:pPr marL="171450" marR="0" lvl="0" indent="-171450" algn="l" defTabSz="914400" rtl="0" eaLnBrk="1" fontAlgn="base" latinLnBrk="0" hangingPunct="1">
+              <a:lnSpc>
+                <a:spcPct val="100000"/>
+              </a:lnSpc>
+              <a:spcBef>
+                <a:spcPct val="0"/>
+              </a:spcBef>
+              <a:spcAft>
+                <a:spcPct val="0"/>
+              </a:spcAft>
+              <a:buClrTx/>
+              <a:buSzTx/>
+              <a:buFont typeface="Wingdings" pitchFamily="2" charset="2"/>
+              <a:buChar char="Ø"/>
+              <a:tabLst/>
+            </a:pPr>
+            <a:r>
+              <a:rPr kumimoji="0" lang="en-US" altLang="en-US" sz="1200" b="0" i="0" u="none" strike="noStrike" cap="none" normalizeH="0" baseline="0" dirty="0" smtClean="0">
+                <a:ln>
+                  <a:noFill/>
+                </a:ln>
+                <a:solidFill>
+                  <a:srgbClr val="B294BB"/>
+                </a:solidFill>
+                <a:effectLst/>
+                <a:latin typeface="Lucida Console" pitchFamily="49" charset="0"/>
+                <a:cs typeface="Arial" pitchFamily="34" charset="0"/>
+              </a:rPr>
+              <a:t>File1&lt;-</a:t>
+            </a:r>
+            <a:r>
+              <a:rPr kumimoji="0" lang="en-US" altLang="en-US" sz="1200" b="0" i="0" u="none" strike="noStrike" cap="none" normalizeH="0" baseline="0" dirty="0" err="1" smtClean="0">
+                <a:ln>
+                  <a:noFill/>
+                </a:ln>
+                <a:solidFill>
+                  <a:srgbClr val="B294BB"/>
+                </a:solidFill>
+                <a:effectLst/>
+                <a:latin typeface="Lucida Console" pitchFamily="49" charset="0"/>
+                <a:cs typeface="Arial" pitchFamily="34" charset="0"/>
+              </a:rPr>
+              <a:t>readData</a:t>
+            </a:r>
+            <a:r>
+              <a:rPr kumimoji="0" lang="en-US" altLang="en-US" sz="1200" b="0" i="0" u="none" strike="noStrike" cap="none" normalizeH="0" baseline="0" dirty="0" smtClean="0">
+                <a:ln>
+                  <a:noFill/>
+                </a:ln>
+                <a:solidFill>
+                  <a:srgbClr val="B294BB"/>
+                </a:solidFill>
+                <a:effectLst/>
+                <a:latin typeface="Lucida Console" pitchFamily="49" charset="0"/>
+                <a:cs typeface="Arial" pitchFamily="34" charset="0"/>
+              </a:rPr>
+              <a:t>(“</a:t>
+            </a:r>
+            <a:r>
+              <a:rPr kumimoji="0" lang="en-US" altLang="en-US" sz="1200" b="0" i="0" u="none" strike="noStrike" cap="none" normalizeH="0" baseline="0" dirty="0" err="1" smtClean="0">
+                <a:ln>
+                  <a:noFill/>
+                </a:ln>
+                <a:solidFill>
+                  <a:srgbClr val="B294BB"/>
+                </a:solidFill>
+                <a:effectLst/>
+                <a:latin typeface="Lucida Console" pitchFamily="49" charset="0"/>
+                <a:cs typeface="Arial" pitchFamily="34" charset="0"/>
+              </a:rPr>
+              <a:t>FastaSeqsPau</a:t>
+            </a:r>
+            <a:r>
+              <a:rPr kumimoji="0" lang="en-US" altLang="en-US" sz="1200" b="0" i="0" u="none" strike="noStrike" cap="none" normalizeH="0" baseline="0" dirty="0" smtClean="0">
+                <a:ln>
+                  <a:noFill/>
+                </a:ln>
+                <a:solidFill>
+                  <a:srgbClr val="B294BB"/>
+                </a:solidFill>
+                <a:effectLst/>
+                <a:latin typeface="Lucida Console" pitchFamily="49" charset="0"/>
+                <a:cs typeface="Arial" pitchFamily="34" charset="0"/>
+              </a:rPr>
+              <a:t>”,</a:t>
+            </a:r>
+            <a:r>
+              <a:rPr kumimoji="0" lang="en-US" altLang="en-US" sz="1200" b="0" i="0" u="none" strike="noStrike" cap="none" normalizeH="0" baseline="0" dirty="0" err="1" smtClean="0">
+                <a:ln>
+                  <a:noFill/>
+                </a:ln>
+                <a:solidFill>
+                  <a:srgbClr val="B294BB"/>
+                </a:solidFill>
+                <a:effectLst/>
+                <a:latin typeface="Lucida Console" pitchFamily="49" charset="0"/>
+                <a:cs typeface="Arial" pitchFamily="34" charset="0"/>
+              </a:rPr>
+              <a:t>include.unknown</a:t>
+            </a:r>
+            <a:r>
+              <a:rPr kumimoji="0" lang="en-US" altLang="en-US" sz="1200" b="0" i="0" u="none" strike="noStrike" cap="none" normalizeH="0" baseline="0" dirty="0" smtClean="0">
+                <a:ln>
+                  <a:noFill/>
+                </a:ln>
+                <a:solidFill>
+                  <a:srgbClr val="B294BB"/>
+                </a:solidFill>
+                <a:effectLst/>
+                <a:latin typeface="Lucida Console" pitchFamily="49" charset="0"/>
+                <a:cs typeface="Arial" pitchFamily="34" charset="0"/>
+              </a:rPr>
+              <a:t>=T)</a:t>
+            </a:r>
+          </a:p>
+          <a:p>
+            <a:pPr marL="171450" marR="0" lvl="0" indent="-171450" algn="l" defTabSz="914400" rtl="0" eaLnBrk="1" fontAlgn="base" latinLnBrk="0" hangingPunct="1">
+              <a:lnSpc>
+                <a:spcPct val="100000"/>
+              </a:lnSpc>
+              <a:spcBef>
+                <a:spcPct val="0"/>
+              </a:spcBef>
+              <a:spcAft>
+                <a:spcPct val="0"/>
+              </a:spcAft>
+              <a:buClrTx/>
+              <a:buSzTx/>
+              <a:buFont typeface="Wingdings" pitchFamily="2" charset="2"/>
+              <a:buChar char="Ø"/>
+              <a:tabLst/>
+            </a:pPr>
+            <a:r>
+              <a:rPr kumimoji="0" lang="en-US" altLang="en-US" sz="1200" b="0" i="0" u="none" strike="noStrike" cap="none" normalizeH="0" baseline="0" dirty="0" smtClean="0">
+                <a:ln>
+                  <a:noFill/>
+                </a:ln>
+                <a:solidFill>
+                  <a:srgbClr val="B294BB"/>
+                </a:solidFill>
+                <a:effectLst/>
+                <a:latin typeface="Lucida Console" pitchFamily="49" charset="0"/>
+                <a:cs typeface="Arial" pitchFamily="34" charset="0"/>
+              </a:rPr>
+              <a:t>file1&lt;-</a:t>
+            </a:r>
+            <a:r>
+              <a:rPr kumimoji="0" lang="en-US" altLang="en-US" sz="1200" b="0" i="0" u="none" strike="noStrike" cap="none" normalizeH="0" baseline="0" dirty="0" err="1" smtClean="0">
+                <a:ln>
+                  <a:noFill/>
+                </a:ln>
+                <a:solidFill>
+                  <a:srgbClr val="B294BB"/>
+                </a:solidFill>
+                <a:effectLst/>
+                <a:latin typeface="Lucida Console" pitchFamily="49" charset="0"/>
+                <a:cs typeface="Arial" pitchFamily="34" charset="0"/>
+              </a:rPr>
+              <a:t>F_ST.stats</a:t>
+            </a:r>
+            <a:r>
+              <a:rPr kumimoji="0" lang="en-US" altLang="en-US" sz="1200" b="0" i="0" u="none" strike="noStrike" cap="none" normalizeH="0" baseline="0" dirty="0" smtClean="0">
+                <a:ln>
+                  <a:noFill/>
+                </a:ln>
+                <a:solidFill>
+                  <a:srgbClr val="B294BB"/>
+                </a:solidFill>
+                <a:effectLst/>
+                <a:latin typeface="Lucida Console" pitchFamily="49" charset="0"/>
+                <a:cs typeface="Arial" pitchFamily="34" charset="0"/>
+              </a:rPr>
+              <a:t>(file1) </a:t>
+            </a:r>
+          </a:p>
+          <a:p>
+            <a:pPr marL="171450" marR="0" lvl="0" indent="-171450" algn="l" defTabSz="914400" rtl="0" eaLnBrk="1" fontAlgn="base" latinLnBrk="0" hangingPunct="1">
+              <a:lnSpc>
+                <a:spcPct val="100000"/>
+              </a:lnSpc>
+              <a:spcBef>
+                <a:spcPct val="0"/>
+              </a:spcBef>
+              <a:spcAft>
+                <a:spcPct val="0"/>
+              </a:spcAft>
+              <a:buClrTx/>
+              <a:buSzTx/>
+              <a:buFont typeface="Wingdings" pitchFamily="2" charset="2"/>
+              <a:buChar char="Ø"/>
+              <a:tabLst/>
+            </a:pPr>
+            <a:r>
+              <a:rPr kumimoji="0" lang="en-US" altLang="en-US" sz="1200" b="0" i="0" u="none" strike="noStrike" cap="none" normalizeH="0" baseline="0" dirty="0" smtClean="0">
+                <a:ln>
+                  <a:noFill/>
+                </a:ln>
+                <a:solidFill>
+                  <a:srgbClr val="B294BB"/>
+                </a:solidFill>
+                <a:effectLst/>
+                <a:latin typeface="Lucida Console" pitchFamily="49" charset="0"/>
+                <a:cs typeface="Arial" pitchFamily="34" charset="0"/>
+              </a:rPr>
+              <a:t>file1@hap.diversity.within </a:t>
+            </a:r>
+            <a:r>
+              <a:rPr kumimoji="0" lang="en-US" altLang="en-US" sz="1200" b="0" i="0" u="none" strike="noStrike" cap="none" normalizeH="0" baseline="0" dirty="0" smtClean="0">
+                <a:ln>
+                  <a:noFill/>
+                </a:ln>
+                <a:solidFill>
+                  <a:srgbClr val="C5C8C6"/>
+                </a:solidFill>
+                <a:effectLst/>
+                <a:latin typeface="Lucida Console" pitchFamily="49" charset="0"/>
+                <a:cs typeface="Arial" pitchFamily="34" charset="0"/>
+              </a:rPr>
+              <a:t>pop 1 </a:t>
+            </a:r>
+          </a:p>
+          <a:p>
+            <a:pPr marL="171450" indent="-171450">
+              <a:buFont typeface="Wingdings" pitchFamily="2" charset="2"/>
+              <a:buChar char="Ø"/>
+            </a:pPr>
+            <a:r>
+              <a:rPr lang="en-US" altLang="en-US" sz="1200" dirty="0">
+                <a:solidFill>
+                  <a:srgbClr val="C5C8C6"/>
+                </a:solidFill>
+                <a:latin typeface="Lucida Console" pitchFamily="49" charset="0"/>
+              </a:rPr>
+              <a:t>pico5.fasta 0.8888889 </a:t>
+            </a:r>
+          </a:p>
+          <a:p>
+            <a:pPr marL="171450" marR="0" lvl="0" indent="-171450" algn="l" defTabSz="914400" rtl="0" eaLnBrk="1" fontAlgn="base" latinLnBrk="0" hangingPunct="1">
+              <a:lnSpc>
+                <a:spcPct val="100000"/>
+              </a:lnSpc>
+              <a:spcBef>
+                <a:spcPct val="0"/>
+              </a:spcBef>
+              <a:spcAft>
+                <a:spcPct val="0"/>
+              </a:spcAft>
+              <a:buClrTx/>
+              <a:buSzTx/>
+              <a:buFont typeface="Wingdings" pitchFamily="2" charset="2"/>
+              <a:buChar char="Ø"/>
+              <a:tabLst/>
+            </a:pPr>
+            <a:r>
+              <a:rPr kumimoji="0" lang="en-US" altLang="en-US" sz="1200" b="0" i="0" u="none" strike="noStrike" cap="none" normalizeH="0" baseline="0" dirty="0" smtClean="0">
+                <a:ln>
+                  <a:noFill/>
+                </a:ln>
+                <a:solidFill>
+                  <a:srgbClr val="C5C8C6"/>
+                </a:solidFill>
+                <a:effectLst/>
+                <a:latin typeface="Lucida Console" pitchFamily="49" charset="0"/>
+                <a:cs typeface="Arial" pitchFamily="34" charset="0"/>
+              </a:rPr>
+              <a:t>pico10.fasta 0.9052632 </a:t>
+            </a:r>
+          </a:p>
+          <a:p>
+            <a:pPr marL="171450" marR="0" lvl="0" indent="-171450" algn="l" defTabSz="914400" rtl="0" eaLnBrk="1" fontAlgn="base" latinLnBrk="0" hangingPunct="1">
+              <a:lnSpc>
+                <a:spcPct val="100000"/>
+              </a:lnSpc>
+              <a:spcBef>
+                <a:spcPct val="0"/>
+              </a:spcBef>
+              <a:spcAft>
+                <a:spcPct val="0"/>
+              </a:spcAft>
+              <a:buClrTx/>
+              <a:buSzTx/>
+              <a:buFont typeface="Wingdings" pitchFamily="2" charset="2"/>
+              <a:buChar char="Ø"/>
+              <a:tabLst/>
+            </a:pPr>
+            <a:r>
+              <a:rPr kumimoji="0" lang="en-US" altLang="en-US" sz="1200" b="0" i="0" u="none" strike="noStrike" cap="none" normalizeH="0" baseline="0" dirty="0" smtClean="0">
+                <a:ln>
+                  <a:noFill/>
+                </a:ln>
+                <a:solidFill>
+                  <a:srgbClr val="C5C8C6"/>
+                </a:solidFill>
+                <a:effectLst/>
+                <a:latin typeface="Lucida Console" pitchFamily="49" charset="0"/>
+                <a:cs typeface="Arial" pitchFamily="34" charset="0"/>
+              </a:rPr>
+              <a:t>pico20.fasta 0.9538462 </a:t>
+            </a:r>
+          </a:p>
+          <a:p>
+            <a:pPr marL="171450" marR="0" lvl="0" indent="-171450" algn="l" defTabSz="914400" rtl="0" eaLnBrk="1" fontAlgn="base" latinLnBrk="0" hangingPunct="1">
+              <a:lnSpc>
+                <a:spcPct val="100000"/>
+              </a:lnSpc>
+              <a:spcBef>
+                <a:spcPct val="0"/>
+              </a:spcBef>
+              <a:spcAft>
+                <a:spcPct val="0"/>
+              </a:spcAft>
+              <a:buClrTx/>
+              <a:buSzTx/>
+              <a:buFont typeface="Wingdings" pitchFamily="2" charset="2"/>
+              <a:buChar char="Ø"/>
+              <a:tabLst/>
+            </a:pPr>
+            <a:r>
+              <a:rPr kumimoji="0" lang="en-US" altLang="en-US" sz="1200" b="0" i="0" u="none" strike="noStrike" cap="none" normalizeH="0" baseline="0" dirty="0" smtClean="0">
+                <a:ln>
+                  <a:noFill/>
+                </a:ln>
+                <a:solidFill>
+                  <a:srgbClr val="C5C8C6"/>
+                </a:solidFill>
+                <a:effectLst/>
+                <a:latin typeface="Lucida Console" pitchFamily="49" charset="0"/>
+                <a:cs typeface="Arial" pitchFamily="34" charset="0"/>
+              </a:rPr>
+              <a:t>pico40.fasta 0.9759494</a:t>
+            </a:r>
+          </a:p>
+          <a:p>
+            <a:pPr marL="171450" marR="0" lvl="0" indent="-171450" algn="l" defTabSz="914400" rtl="0" eaLnBrk="1" fontAlgn="base" latinLnBrk="0" hangingPunct="1">
+              <a:lnSpc>
+                <a:spcPct val="100000"/>
+              </a:lnSpc>
+              <a:spcBef>
+                <a:spcPct val="0"/>
+              </a:spcBef>
+              <a:spcAft>
+                <a:spcPct val="0"/>
+              </a:spcAft>
+              <a:buClrTx/>
+              <a:buSzTx/>
+              <a:buFont typeface="Wingdings" pitchFamily="2" charset="2"/>
+              <a:buChar char="Ø"/>
+              <a:tabLst/>
+            </a:pPr>
+            <a:r>
+              <a:rPr kumimoji="0" lang="en-US" altLang="en-US" sz="1200" b="0" i="0" u="none" strike="noStrike" cap="none" normalizeH="0" baseline="0" dirty="0" smtClean="0">
+                <a:ln>
+                  <a:noFill/>
+                </a:ln>
+                <a:solidFill>
+                  <a:srgbClr val="C5C8C6"/>
+                </a:solidFill>
+                <a:effectLst/>
+                <a:latin typeface="Lucida Console" pitchFamily="49" charset="0"/>
+                <a:cs typeface="Arial" pitchFamily="34" charset="0"/>
+              </a:rPr>
+              <a:t>pico80.fasta 0.9726415 </a:t>
+            </a:r>
+          </a:p>
+          <a:p>
+            <a:pPr marL="171450" indent="-171450">
+              <a:buFont typeface="Wingdings" pitchFamily="2" charset="2"/>
+              <a:buChar char="Ø"/>
+            </a:pPr>
+            <a:r>
+              <a:rPr lang="en-US" altLang="en-US" sz="1200" dirty="0">
+                <a:solidFill>
+                  <a:srgbClr val="C5C8C6"/>
+                </a:solidFill>
+                <a:latin typeface="Lucida Console" pitchFamily="49" charset="0"/>
+              </a:rPr>
+              <a:t>pico100.fasta 0.9730653 </a:t>
+            </a:r>
+          </a:p>
+          <a:p>
+            <a:pPr marL="171450" marR="0" lvl="0" indent="-171450" algn="l" defTabSz="914400" rtl="0" eaLnBrk="1" fontAlgn="base" latinLnBrk="0" hangingPunct="1">
+              <a:lnSpc>
+                <a:spcPct val="100000"/>
+              </a:lnSpc>
+              <a:spcBef>
+                <a:spcPct val="0"/>
+              </a:spcBef>
+              <a:spcAft>
+                <a:spcPct val="0"/>
+              </a:spcAft>
+              <a:buClrTx/>
+              <a:buSzTx/>
+              <a:buFont typeface="Wingdings" pitchFamily="2" charset="2"/>
+              <a:buChar char="Ø"/>
+              <a:tabLst/>
+            </a:pPr>
+            <a:r>
+              <a:rPr kumimoji="0" lang="en-US" altLang="en-US" sz="1200" b="0" i="0" u="none" strike="noStrike" cap="none" normalizeH="0" baseline="0" dirty="0" err="1" smtClean="0">
+                <a:ln>
+                  <a:noFill/>
+                </a:ln>
+                <a:solidFill>
+                  <a:srgbClr val="C5C8C6"/>
+                </a:solidFill>
+                <a:effectLst/>
+                <a:latin typeface="Lucida Console" pitchFamily="49" charset="0"/>
+                <a:cs typeface="Arial" pitchFamily="34" charset="0"/>
+              </a:rPr>
+              <a:t>PicoAligned.fasta</a:t>
+            </a:r>
+            <a:r>
+              <a:rPr kumimoji="0" lang="en-US" altLang="en-US" sz="1200" b="0" i="0" u="none" strike="noStrike" cap="none" normalizeH="0" baseline="0" dirty="0" smtClean="0">
+                <a:ln>
+                  <a:noFill/>
+                </a:ln>
+                <a:solidFill>
+                  <a:srgbClr val="C5C8C6"/>
+                </a:solidFill>
+                <a:effectLst/>
+                <a:latin typeface="Lucida Console" pitchFamily="49" charset="0"/>
+                <a:cs typeface="Arial" pitchFamily="34" charset="0"/>
+              </a:rPr>
+              <a:t> 0.9744361 </a:t>
+            </a:r>
+          </a:p>
+          <a:p>
+            <a:pPr marL="171450" marR="0" lvl="0" indent="-171450" algn="l" defTabSz="914400" rtl="0" eaLnBrk="1" fontAlgn="base" latinLnBrk="0" hangingPunct="1">
+              <a:lnSpc>
+                <a:spcPct val="100000"/>
+              </a:lnSpc>
+              <a:spcBef>
+                <a:spcPct val="0"/>
+              </a:spcBef>
+              <a:spcAft>
+                <a:spcPct val="0"/>
+              </a:spcAft>
+              <a:buClrTx/>
+              <a:buSzTx/>
+              <a:buFont typeface="Wingdings" pitchFamily="2" charset="2"/>
+              <a:buChar char="Ø"/>
+              <a:tabLst/>
+            </a:pPr>
+            <a:endParaRPr lang="en-US" altLang="en-US" sz="1200" dirty="0">
+              <a:solidFill>
+                <a:srgbClr val="C5C8C6"/>
+              </a:solidFill>
+              <a:latin typeface="Lucida Console" pitchFamily="49" charset="0"/>
+            </a:endParaRPr>
+          </a:p>
+          <a:p>
+            <a:pPr marL="171450" marR="0" lvl="0" indent="-171450" algn="l" defTabSz="914400" rtl="0" eaLnBrk="1" fontAlgn="base" latinLnBrk="0" hangingPunct="1">
+              <a:lnSpc>
+                <a:spcPct val="100000"/>
+              </a:lnSpc>
+              <a:spcBef>
+                <a:spcPct val="0"/>
+              </a:spcBef>
+              <a:spcAft>
+                <a:spcPct val="0"/>
+              </a:spcAft>
+              <a:buClrTx/>
+              <a:buSzTx/>
+              <a:buFont typeface="Wingdings" pitchFamily="2" charset="2"/>
+              <a:buChar char="Ø"/>
+              <a:tabLst/>
+            </a:pPr>
+            <a:r>
+              <a:rPr kumimoji="0" lang="en-US" altLang="en-US" sz="1200" b="0" i="0" u="none" strike="noStrike" cap="none" normalizeH="0" baseline="0" dirty="0" smtClean="0">
+                <a:ln>
+                  <a:noFill/>
+                </a:ln>
+                <a:solidFill>
+                  <a:srgbClr val="B294BB"/>
+                </a:solidFill>
+                <a:effectLst/>
+                <a:latin typeface="Lucida Console" pitchFamily="49" charset="0"/>
+                <a:cs typeface="Arial" pitchFamily="34" charset="0"/>
+              </a:rPr>
+              <a:t>file1@Pi </a:t>
+            </a:r>
+            <a:r>
+              <a:rPr kumimoji="0" lang="en-US" altLang="en-US" sz="1200" b="0" i="0" u="none" strike="noStrike" cap="none" normalizeH="0" baseline="0" dirty="0" smtClean="0">
+                <a:ln>
+                  <a:noFill/>
+                </a:ln>
+                <a:solidFill>
+                  <a:srgbClr val="C5C8C6"/>
+                </a:solidFill>
+                <a:effectLst/>
+                <a:latin typeface="Lucida Console" pitchFamily="49" charset="0"/>
+                <a:cs typeface="Arial" pitchFamily="34" charset="0"/>
+              </a:rPr>
+              <a:t>pop 1 </a:t>
+            </a:r>
+          </a:p>
+          <a:p>
+            <a:pPr marL="171450" lvl="0" indent="-171450">
+              <a:buFont typeface="Wingdings" pitchFamily="2" charset="2"/>
+              <a:buChar char="Ø"/>
+            </a:pPr>
+            <a:r>
+              <a:rPr lang="en-US" altLang="en-US" sz="1200" dirty="0">
+                <a:solidFill>
+                  <a:srgbClr val="C5C8C6"/>
+                </a:solidFill>
+                <a:latin typeface="Lucida Console" pitchFamily="49" charset="0"/>
+              </a:rPr>
+              <a:t>pico5.fasta 5.511111</a:t>
+            </a:r>
+            <a:endParaRPr kumimoji="0" lang="en-US" altLang="en-US" sz="1200" b="0" i="0" u="none" strike="noStrike" cap="none" normalizeH="0" baseline="0" dirty="0" smtClean="0">
+              <a:ln>
+                <a:noFill/>
+              </a:ln>
+              <a:solidFill>
+                <a:srgbClr val="C5C8C6"/>
+              </a:solidFill>
+              <a:effectLst/>
+              <a:latin typeface="Lucida Console" pitchFamily="49" charset="0"/>
+              <a:cs typeface="Arial" pitchFamily="34" charset="0"/>
+            </a:endParaRPr>
+          </a:p>
+          <a:p>
+            <a:pPr marL="171450" marR="0" lvl="0" indent="-171450" algn="l" defTabSz="914400" rtl="0" eaLnBrk="1" fontAlgn="base" latinLnBrk="0" hangingPunct="1">
+              <a:lnSpc>
+                <a:spcPct val="100000"/>
+              </a:lnSpc>
+              <a:spcBef>
+                <a:spcPct val="0"/>
+              </a:spcBef>
+              <a:spcAft>
+                <a:spcPct val="0"/>
+              </a:spcAft>
+              <a:buClrTx/>
+              <a:buSzTx/>
+              <a:buFont typeface="Wingdings" pitchFamily="2" charset="2"/>
+              <a:buChar char="Ø"/>
+              <a:tabLst/>
+            </a:pPr>
+            <a:r>
+              <a:rPr kumimoji="0" lang="en-US" altLang="en-US" sz="1200" b="0" i="0" u="none" strike="noStrike" cap="none" normalizeH="0" baseline="0" dirty="0" smtClean="0">
+                <a:ln>
+                  <a:noFill/>
+                </a:ln>
+                <a:solidFill>
+                  <a:srgbClr val="C5C8C6"/>
+                </a:solidFill>
+                <a:effectLst/>
+                <a:latin typeface="Lucida Console" pitchFamily="49" charset="0"/>
+                <a:cs typeface="Arial" pitchFamily="34" charset="0"/>
+              </a:rPr>
+              <a:t>pico10.fasta 6.021053</a:t>
+            </a:r>
+          </a:p>
+          <a:p>
+            <a:pPr marL="171450" marR="0" lvl="0" indent="-171450" algn="l" defTabSz="914400" rtl="0" eaLnBrk="1" fontAlgn="base" latinLnBrk="0" hangingPunct="1">
+              <a:lnSpc>
+                <a:spcPct val="100000"/>
+              </a:lnSpc>
+              <a:spcBef>
+                <a:spcPct val="0"/>
+              </a:spcBef>
+              <a:spcAft>
+                <a:spcPct val="0"/>
+              </a:spcAft>
+              <a:buClrTx/>
+              <a:buSzTx/>
+              <a:buFont typeface="Wingdings" pitchFamily="2" charset="2"/>
+              <a:buChar char="Ø"/>
+              <a:tabLst/>
+            </a:pPr>
+            <a:r>
+              <a:rPr kumimoji="0" lang="en-US" altLang="en-US" sz="1200" b="0" i="0" u="none" strike="noStrike" cap="none" normalizeH="0" baseline="0" dirty="0" smtClean="0">
+                <a:ln>
+                  <a:noFill/>
+                </a:ln>
+                <a:solidFill>
+                  <a:srgbClr val="C5C8C6"/>
+                </a:solidFill>
+                <a:effectLst/>
+                <a:latin typeface="Lucida Console" pitchFamily="49" charset="0"/>
+                <a:cs typeface="Arial" pitchFamily="34" charset="0"/>
+              </a:rPr>
+              <a:t>pico20.fasta 5.769231 </a:t>
+            </a:r>
+          </a:p>
+          <a:p>
+            <a:pPr marL="171450" marR="0" lvl="0" indent="-171450" algn="l" defTabSz="914400" rtl="0" eaLnBrk="1" fontAlgn="base" latinLnBrk="0" hangingPunct="1">
+              <a:lnSpc>
+                <a:spcPct val="100000"/>
+              </a:lnSpc>
+              <a:spcBef>
+                <a:spcPct val="0"/>
+              </a:spcBef>
+              <a:spcAft>
+                <a:spcPct val="0"/>
+              </a:spcAft>
+              <a:buClrTx/>
+              <a:buSzTx/>
+              <a:buFont typeface="Wingdings" pitchFamily="2" charset="2"/>
+              <a:buChar char="Ø"/>
+              <a:tabLst/>
+            </a:pPr>
+            <a:r>
+              <a:rPr kumimoji="0" lang="en-US" altLang="en-US" sz="1200" b="0" i="0" u="none" strike="noStrike" cap="none" normalizeH="0" baseline="0" dirty="0" smtClean="0">
+                <a:ln>
+                  <a:noFill/>
+                </a:ln>
+                <a:solidFill>
+                  <a:srgbClr val="C5C8C6"/>
+                </a:solidFill>
+                <a:effectLst/>
+                <a:latin typeface="Lucida Console" pitchFamily="49" charset="0"/>
+                <a:cs typeface="Arial" pitchFamily="34" charset="0"/>
+              </a:rPr>
+              <a:t>pico40.fasta 5.964557</a:t>
+            </a:r>
+          </a:p>
+          <a:p>
+            <a:pPr marL="171450" marR="0" lvl="0" indent="-171450" algn="l" defTabSz="914400" rtl="0" eaLnBrk="1" fontAlgn="base" latinLnBrk="0" hangingPunct="1">
+              <a:lnSpc>
+                <a:spcPct val="100000"/>
+              </a:lnSpc>
+              <a:spcBef>
+                <a:spcPct val="0"/>
+              </a:spcBef>
+              <a:spcAft>
+                <a:spcPct val="0"/>
+              </a:spcAft>
+              <a:buClrTx/>
+              <a:buSzTx/>
+              <a:buFont typeface="Wingdings" pitchFamily="2" charset="2"/>
+              <a:buChar char="Ø"/>
+              <a:tabLst/>
+            </a:pPr>
+            <a:r>
+              <a:rPr kumimoji="0" lang="en-US" altLang="en-US" sz="1200" b="0" i="0" u="none" strike="noStrike" cap="none" normalizeH="0" baseline="0" dirty="0" smtClean="0">
+                <a:ln>
+                  <a:noFill/>
+                </a:ln>
+                <a:solidFill>
+                  <a:srgbClr val="C5C8C6"/>
+                </a:solidFill>
+                <a:effectLst/>
+                <a:latin typeface="Lucida Console" pitchFamily="49" charset="0"/>
+                <a:cs typeface="Arial" pitchFamily="34" charset="0"/>
+              </a:rPr>
+              <a:t>pico80.fasta 4.905346</a:t>
+            </a:r>
+          </a:p>
+          <a:p>
+            <a:pPr marL="171450" indent="-171450">
+              <a:buFont typeface="Wingdings" pitchFamily="2" charset="2"/>
+              <a:buChar char="Ø"/>
+            </a:pPr>
+            <a:r>
+              <a:rPr lang="en-US" altLang="en-US" sz="1200" dirty="0">
+                <a:solidFill>
+                  <a:srgbClr val="C5C8C6"/>
+                </a:solidFill>
+                <a:latin typeface="Lucida Console" pitchFamily="49" charset="0"/>
+              </a:rPr>
+              <a:t>pico100.fasta 4.840201 </a:t>
+            </a:r>
+          </a:p>
+          <a:p>
+            <a:pPr marL="171450" marR="0" lvl="0" indent="-171450" algn="l" defTabSz="914400" rtl="0" eaLnBrk="1" fontAlgn="base" latinLnBrk="0" hangingPunct="1">
+              <a:lnSpc>
+                <a:spcPct val="100000"/>
+              </a:lnSpc>
+              <a:spcBef>
+                <a:spcPct val="0"/>
+              </a:spcBef>
+              <a:spcAft>
+                <a:spcPct val="0"/>
+              </a:spcAft>
+              <a:buClrTx/>
+              <a:buSzTx/>
+              <a:buFont typeface="Wingdings" pitchFamily="2" charset="2"/>
+              <a:buChar char="Ø"/>
+              <a:tabLst/>
+            </a:pPr>
+            <a:r>
+              <a:rPr kumimoji="0" lang="en-US" altLang="en-US" sz="1200" b="0" i="0" u="none" strike="noStrike" cap="none" normalizeH="0" baseline="0" dirty="0" err="1" smtClean="0">
+                <a:ln>
+                  <a:noFill/>
+                </a:ln>
+                <a:solidFill>
+                  <a:srgbClr val="C5C8C6"/>
+                </a:solidFill>
+                <a:effectLst/>
+                <a:latin typeface="Lucida Console" pitchFamily="49" charset="0"/>
+                <a:cs typeface="Arial" pitchFamily="34" charset="0"/>
+              </a:rPr>
+              <a:t>PicoAligned.fasta</a:t>
+            </a:r>
+            <a:r>
+              <a:rPr kumimoji="0" lang="en-US" altLang="en-US" sz="1200" b="0" i="0" u="none" strike="noStrike" cap="none" normalizeH="0" baseline="0" dirty="0" smtClean="0">
+                <a:ln>
+                  <a:noFill/>
+                </a:ln>
+                <a:solidFill>
+                  <a:srgbClr val="C5C8C6"/>
+                </a:solidFill>
+                <a:effectLst/>
+                <a:latin typeface="Lucida Console" pitchFamily="49" charset="0"/>
+                <a:cs typeface="Arial" pitchFamily="34" charset="0"/>
+              </a:rPr>
+              <a:t> 4.922853</a:t>
+            </a:r>
+            <a:endParaRPr kumimoji="0" lang="en-US" altLang="en-US" sz="1800" b="0" i="0" u="none" strike="noStrike" cap="none" normalizeH="0" baseline="0" dirty="0" smtClean="0">
+              <a:ln>
+                <a:noFill/>
+              </a:ln>
+              <a:solidFill>
+                <a:schemeClr val="tx1"/>
+              </a:solidFill>
+              <a:effectLst/>
+              <a:latin typeface="Arial" pitchFamily="34" charset="0"/>
+              <a:cs typeface="Arial" pitchFamily="34" charset="0"/>
+            </a:endParaRPr>
+          </a:p>
+        </p:txBody>
+      </p:sp>
+      <p:sp>
+        <p:nvSpPr>
+          <p:cNvPr id="3" name="Rectangle 2"/>
+          <p:cNvSpPr>
+            <a:spLocks noChangeArrowheads="1"/>
+          </p:cNvSpPr>
+          <p:nvPr/>
+        </p:nvSpPr>
+        <p:spPr bwMode="auto">
+          <a:xfrm>
+            <a:off x="3635896" y="1384360"/>
+            <a:ext cx="4896544" cy="3508653"/>
+          </a:xfrm>
+          <a:prstGeom prst="rect">
+            <a:avLst/>
+          </a:prstGeom>
+          <a:solidFill>
+            <a:srgbClr val="1D1F21"/>
+          </a:solidFill>
+          <a:ln>
+            <a:noFill/>
+          </a:ln>
+          <a:effectLst/>
+          <a:extLst>
+            <a:ext uri="{91240B29-F687-4F45-9708-019B960494DF}">
+              <a14:hiddenLine xmlns:a14="http://schemas.microsoft.com/office/drawing/2010/main" w="9525">
+                <a:solidFill>
+                  <a:schemeClr val="tx1"/>
+                </a:solidFill>
+                <a:miter lim="800000"/>
+                <a:headEnd/>
+                <a:tailEnd/>
+              </a14:hiddenLine>
+            </a:ext>
+            <a:ext uri="{AF507438-7753-43E0-B8FC-AC1667EBCBE1}">
+              <a14:hiddenEffects xmlns:a14="http://schemas.microsoft.com/office/drawing/2010/main">
+                <a:effectLst>
+                  <a:outerShdw dist="35921" dir="2700000" algn="ctr" rotWithShape="0">
+                    <a:schemeClr val="bg2"/>
+                  </a:outerShdw>
+                </a:effectLst>
+              </a14:hiddenEffects>
+            </a:ext>
+          </a:extLst>
+        </p:spPr>
+        <p:txBody>
+          <a:bodyPr vert="horz" wrap="square" lIns="0" tIns="0" rIns="0" bIns="0" numCol="1" anchor="ctr" anchorCtr="0" compatLnSpc="1">
+            <a:prstTxWarp prst="textNoShape">
+              <a:avLst/>
+            </a:prstTxWarp>
+            <a:spAutoFit/>
+          </a:bodyPr>
+          <a:lstStyle>
+            <a:lvl1pPr fontAlgn="base">
+              <a:spcBef>
+                <a:spcPct val="0"/>
+              </a:spcBef>
+              <a:spcAft>
+                <a:spcPct val="0"/>
+              </a:spcAft>
+              <a:defRPr>
+                <a:solidFill>
+                  <a:schemeClr val="tx1"/>
+                </a:solidFill>
+                <a:latin typeface="Arial" pitchFamily="34" charset="0"/>
+                <a:cs typeface="Arial" pitchFamily="34" charset="0"/>
+              </a:defRPr>
+            </a:lvl1pPr>
+            <a:lvl2pPr fontAlgn="base">
+              <a:spcBef>
+                <a:spcPct val="0"/>
+              </a:spcBef>
+              <a:spcAft>
+                <a:spcPct val="0"/>
+              </a:spcAft>
+              <a:defRPr>
+                <a:solidFill>
+                  <a:schemeClr val="tx1"/>
+                </a:solidFill>
+                <a:latin typeface="Arial" pitchFamily="34" charset="0"/>
+                <a:cs typeface="Arial" pitchFamily="34" charset="0"/>
+              </a:defRPr>
+            </a:lvl2pPr>
+            <a:lvl3pPr fontAlgn="base">
+              <a:spcBef>
+                <a:spcPct val="0"/>
+              </a:spcBef>
+              <a:spcAft>
+                <a:spcPct val="0"/>
+              </a:spcAft>
+              <a:defRPr>
+                <a:solidFill>
+                  <a:schemeClr val="tx1"/>
+                </a:solidFill>
+                <a:latin typeface="Arial" pitchFamily="34" charset="0"/>
+                <a:cs typeface="Arial" pitchFamily="34" charset="0"/>
+              </a:defRPr>
+            </a:lvl3pPr>
+            <a:lvl4pPr fontAlgn="base">
+              <a:spcBef>
+                <a:spcPct val="0"/>
+              </a:spcBef>
+              <a:spcAft>
+                <a:spcPct val="0"/>
+              </a:spcAft>
+              <a:defRPr>
+                <a:solidFill>
+                  <a:schemeClr val="tx1"/>
+                </a:solidFill>
+                <a:latin typeface="Arial" pitchFamily="34" charset="0"/>
+                <a:cs typeface="Arial" pitchFamily="34" charset="0"/>
+              </a:defRPr>
+            </a:lvl4pPr>
+            <a:lvl5pPr fontAlgn="base">
+              <a:spcBef>
+                <a:spcPct val="0"/>
+              </a:spcBef>
+              <a:spcAft>
+                <a:spcPct val="0"/>
+              </a:spcAft>
+              <a:defRPr>
+                <a:solidFill>
+                  <a:schemeClr val="tx1"/>
+                </a:solidFill>
+                <a:latin typeface="Arial" pitchFamily="34" charset="0"/>
+                <a:cs typeface="Arial" pitchFamily="34" charset="0"/>
+              </a:defRPr>
+            </a:lvl5pPr>
+            <a:lvl6pPr fontAlgn="base">
+              <a:spcBef>
+                <a:spcPct val="0"/>
+              </a:spcBef>
+              <a:spcAft>
+                <a:spcPct val="0"/>
+              </a:spcAft>
+              <a:defRPr>
+                <a:solidFill>
+                  <a:schemeClr val="tx1"/>
+                </a:solidFill>
+                <a:latin typeface="Arial" pitchFamily="34" charset="0"/>
+                <a:cs typeface="Arial" pitchFamily="34" charset="0"/>
+              </a:defRPr>
+            </a:lvl6pPr>
+            <a:lvl7pPr fontAlgn="base">
+              <a:spcBef>
+                <a:spcPct val="0"/>
+              </a:spcBef>
+              <a:spcAft>
+                <a:spcPct val="0"/>
+              </a:spcAft>
+              <a:defRPr>
+                <a:solidFill>
+                  <a:schemeClr val="tx1"/>
+                </a:solidFill>
+                <a:latin typeface="Arial" pitchFamily="34" charset="0"/>
+                <a:cs typeface="Arial" pitchFamily="34" charset="0"/>
+              </a:defRPr>
+            </a:lvl7pPr>
+            <a:lvl8pPr fontAlgn="base">
+              <a:spcBef>
+                <a:spcPct val="0"/>
+              </a:spcBef>
+              <a:spcAft>
+                <a:spcPct val="0"/>
+              </a:spcAft>
+              <a:defRPr>
+                <a:solidFill>
+                  <a:schemeClr val="tx1"/>
+                </a:solidFill>
+                <a:latin typeface="Arial" pitchFamily="34" charset="0"/>
+                <a:cs typeface="Arial" pitchFamily="34" charset="0"/>
+              </a:defRPr>
+            </a:lvl8pPr>
+            <a:lvl9pPr fontAlgn="base">
+              <a:spcBef>
+                <a:spcPct val="0"/>
+              </a:spcBef>
+              <a:spcAft>
+                <a:spcPct val="0"/>
+              </a:spcAft>
+              <a:defRPr>
+                <a:solidFill>
+                  <a:schemeClr val="tx1"/>
+                </a:solidFill>
+                <a:latin typeface="Arial" pitchFamily="34" charset="0"/>
+                <a:cs typeface="Arial" pitchFamily="34" charset="0"/>
+              </a:defRPr>
+            </a:lvl9pPr>
+          </a:lstStyle>
+          <a:p>
+            <a:pPr marL="171450" marR="0" lvl="0" indent="-171450" algn="l" defTabSz="914400" rtl="0" eaLnBrk="1" fontAlgn="base" latinLnBrk="0" hangingPunct="1">
+              <a:lnSpc>
+                <a:spcPct val="100000"/>
+              </a:lnSpc>
+              <a:spcBef>
+                <a:spcPct val="0"/>
+              </a:spcBef>
+              <a:spcAft>
+                <a:spcPct val="0"/>
+              </a:spcAft>
+              <a:buClrTx/>
+              <a:buSzTx/>
+              <a:buFont typeface="Wingdings" pitchFamily="2" charset="2"/>
+              <a:buChar char="Ø"/>
+              <a:tabLst/>
+            </a:pPr>
+            <a:r>
+              <a:rPr kumimoji="0" lang="en-US" altLang="en-US" sz="1200" b="0" i="0" u="none" strike="noStrike" cap="none" normalizeH="0" baseline="0" dirty="0" smtClean="0">
+                <a:ln>
+                  <a:noFill/>
+                </a:ln>
+                <a:solidFill>
+                  <a:srgbClr val="B294BB"/>
+                </a:solidFill>
+                <a:effectLst/>
+                <a:latin typeface="Lucida Console" pitchFamily="49" charset="0"/>
+                <a:cs typeface="Arial" pitchFamily="34" charset="0"/>
+              </a:rPr>
+              <a:t>file2&lt;-</a:t>
+            </a:r>
+            <a:r>
+              <a:rPr kumimoji="0" lang="en-US" altLang="en-US" sz="1200" b="0" i="0" u="none" strike="noStrike" cap="none" normalizeH="0" baseline="0" dirty="0" err="1" smtClean="0">
+                <a:ln>
+                  <a:noFill/>
+                </a:ln>
+                <a:solidFill>
+                  <a:srgbClr val="B294BB"/>
+                </a:solidFill>
+                <a:effectLst/>
+                <a:latin typeface="Lucida Console" pitchFamily="49" charset="0"/>
+                <a:cs typeface="Arial" pitchFamily="34" charset="0"/>
+              </a:rPr>
+              <a:t>readData</a:t>
+            </a:r>
+            <a:r>
+              <a:rPr kumimoji="0" lang="en-US" altLang="en-US" sz="1200" b="0" i="0" u="none" strike="noStrike" cap="none" normalizeH="0" baseline="0" dirty="0" smtClean="0">
+                <a:ln>
+                  <a:noFill/>
+                </a:ln>
+                <a:solidFill>
+                  <a:srgbClr val="B294BB"/>
+                </a:solidFill>
+                <a:effectLst/>
+                <a:latin typeface="Lucida Console" pitchFamily="49" charset="0"/>
+                <a:cs typeface="Arial" pitchFamily="34" charset="0"/>
+              </a:rPr>
+              <a:t>("</a:t>
+            </a:r>
+            <a:r>
+              <a:rPr kumimoji="0" lang="en-US" altLang="en-US" sz="1200" b="0" i="0" u="none" strike="noStrike" cap="none" normalizeH="0" baseline="0" dirty="0" err="1" smtClean="0">
+                <a:ln>
+                  <a:noFill/>
+                </a:ln>
+                <a:solidFill>
+                  <a:srgbClr val="B294BB"/>
+                </a:solidFill>
+                <a:effectLst/>
+                <a:latin typeface="Lucida Console" pitchFamily="49" charset="0"/>
+                <a:cs typeface="Arial" pitchFamily="34" charset="0"/>
+              </a:rPr>
+              <a:t>FastaSeqsPau</a:t>
+            </a:r>
+            <a:r>
+              <a:rPr kumimoji="0" lang="en-US" altLang="en-US" sz="1200" b="0" i="0" u="none" strike="noStrike" cap="none" normalizeH="0" baseline="0" dirty="0" smtClean="0">
+                <a:ln>
+                  <a:noFill/>
+                </a:ln>
+                <a:solidFill>
+                  <a:srgbClr val="B294BB"/>
+                </a:solidFill>
+                <a:effectLst/>
+                <a:latin typeface="Lucida Console" pitchFamily="49" charset="0"/>
+                <a:cs typeface="Arial" pitchFamily="34" charset="0"/>
+              </a:rPr>
+              <a:t>",</a:t>
+            </a:r>
+            <a:r>
+              <a:rPr kumimoji="0" lang="en-US" altLang="en-US" sz="1200" b="0" i="0" u="none" strike="noStrike" cap="none" normalizeH="0" baseline="0" dirty="0" err="1" smtClean="0">
+                <a:ln>
+                  <a:noFill/>
+                </a:ln>
+                <a:solidFill>
+                  <a:srgbClr val="B294BB"/>
+                </a:solidFill>
+                <a:effectLst/>
+                <a:latin typeface="Lucida Console" pitchFamily="49" charset="0"/>
+                <a:cs typeface="Arial" pitchFamily="34" charset="0"/>
+              </a:rPr>
+              <a:t>include.unknown</a:t>
+            </a:r>
+            <a:r>
+              <a:rPr kumimoji="0" lang="en-US" altLang="en-US" sz="1200" b="0" i="0" u="none" strike="noStrike" cap="none" normalizeH="0" baseline="0" dirty="0" smtClean="0">
+                <a:ln>
+                  <a:noFill/>
+                </a:ln>
+                <a:solidFill>
+                  <a:srgbClr val="B294BB"/>
+                </a:solidFill>
+                <a:effectLst/>
+                <a:latin typeface="Lucida Console" pitchFamily="49" charset="0"/>
+                <a:cs typeface="Arial" pitchFamily="34" charset="0"/>
+              </a:rPr>
+              <a:t>=T) </a:t>
+            </a:r>
+          </a:p>
+          <a:p>
+            <a:pPr marL="171450" marR="0" lvl="0" indent="-171450" algn="l" defTabSz="914400" rtl="0" eaLnBrk="1" fontAlgn="base" latinLnBrk="0" hangingPunct="1">
+              <a:lnSpc>
+                <a:spcPct val="100000"/>
+              </a:lnSpc>
+              <a:spcBef>
+                <a:spcPct val="0"/>
+              </a:spcBef>
+              <a:spcAft>
+                <a:spcPct val="0"/>
+              </a:spcAft>
+              <a:buClrTx/>
+              <a:buSzTx/>
+              <a:buFont typeface="Wingdings" pitchFamily="2" charset="2"/>
+              <a:buChar char="Ø"/>
+              <a:tabLst/>
+            </a:pPr>
+            <a:r>
+              <a:rPr kumimoji="0" lang="en-US" altLang="en-US" sz="1200" b="0" i="0" u="none" strike="noStrike" cap="none" normalizeH="0" baseline="0" dirty="0" smtClean="0">
+                <a:ln>
+                  <a:noFill/>
+                </a:ln>
+                <a:solidFill>
+                  <a:srgbClr val="B294BB"/>
+                </a:solidFill>
+                <a:effectLst/>
+                <a:latin typeface="Lucida Console" pitchFamily="49" charset="0"/>
+                <a:cs typeface="Arial" pitchFamily="34" charset="0"/>
+              </a:rPr>
+              <a:t>&gt; </a:t>
+            </a:r>
+            <a:r>
+              <a:rPr kumimoji="0" lang="en-US" altLang="en-US" sz="1200" b="0" i="0" u="none" strike="noStrike" cap="none" normalizeH="0" baseline="0" dirty="0" err="1" smtClean="0">
+                <a:ln>
+                  <a:noFill/>
+                </a:ln>
+                <a:solidFill>
+                  <a:srgbClr val="B294BB"/>
+                </a:solidFill>
+                <a:effectLst/>
+                <a:latin typeface="Lucida Console" pitchFamily="49" charset="0"/>
+                <a:cs typeface="Arial" pitchFamily="34" charset="0"/>
+              </a:rPr>
+              <a:t>diversity.stats</a:t>
+            </a:r>
+            <a:r>
+              <a:rPr kumimoji="0" lang="en-US" altLang="en-US" sz="1200" b="0" i="0" u="none" strike="noStrike" cap="none" normalizeH="0" baseline="0" dirty="0" smtClean="0">
+                <a:ln>
+                  <a:noFill/>
+                </a:ln>
+                <a:solidFill>
+                  <a:srgbClr val="B294BB"/>
+                </a:solidFill>
+                <a:effectLst/>
+                <a:latin typeface="Lucida Console" pitchFamily="49" charset="0"/>
+                <a:cs typeface="Arial" pitchFamily="34" charset="0"/>
+              </a:rPr>
+              <a:t>(file2,pi=TRUE)-&gt;file2 file2@hap.diversity.within </a:t>
+            </a:r>
+            <a:r>
+              <a:rPr kumimoji="0" lang="en-US" altLang="en-US" sz="1200" b="0" i="0" u="none" strike="noStrike" cap="none" normalizeH="0" baseline="0" dirty="0" smtClean="0">
+                <a:ln>
+                  <a:noFill/>
+                </a:ln>
+                <a:solidFill>
+                  <a:srgbClr val="C5C8C6"/>
+                </a:solidFill>
+                <a:effectLst/>
+                <a:latin typeface="Lucida Console" pitchFamily="49" charset="0"/>
+                <a:cs typeface="Arial" pitchFamily="34" charset="0"/>
+              </a:rPr>
+              <a:t>pop 1 </a:t>
+            </a:r>
+          </a:p>
+          <a:p>
+            <a:pPr marL="171450" indent="-171450">
+              <a:buFont typeface="Wingdings" pitchFamily="2" charset="2"/>
+              <a:buChar char="Ø"/>
+            </a:pPr>
+            <a:r>
+              <a:rPr lang="en-US" altLang="en-US" sz="1200" dirty="0">
+                <a:solidFill>
+                  <a:srgbClr val="C5C8C6"/>
+                </a:solidFill>
+                <a:latin typeface="Lucida Console" pitchFamily="49" charset="0"/>
+              </a:rPr>
+              <a:t>pico5.fasta 0.8888889 </a:t>
+            </a:r>
+          </a:p>
+          <a:p>
+            <a:pPr marL="171450" marR="0" lvl="0" indent="-171450" algn="l" defTabSz="914400" rtl="0" eaLnBrk="1" fontAlgn="base" latinLnBrk="0" hangingPunct="1">
+              <a:lnSpc>
+                <a:spcPct val="100000"/>
+              </a:lnSpc>
+              <a:spcBef>
+                <a:spcPct val="0"/>
+              </a:spcBef>
+              <a:spcAft>
+                <a:spcPct val="0"/>
+              </a:spcAft>
+              <a:buClrTx/>
+              <a:buSzTx/>
+              <a:buFont typeface="Wingdings" pitchFamily="2" charset="2"/>
+              <a:buChar char="Ø"/>
+              <a:tabLst/>
+            </a:pPr>
+            <a:r>
+              <a:rPr kumimoji="0" lang="en-US" altLang="en-US" sz="1200" b="0" i="0" u="none" strike="noStrike" cap="none" normalizeH="0" baseline="0" dirty="0" smtClean="0">
+                <a:ln>
+                  <a:noFill/>
+                </a:ln>
+                <a:solidFill>
+                  <a:srgbClr val="C5C8C6"/>
+                </a:solidFill>
+                <a:effectLst/>
+                <a:latin typeface="Lucida Console" pitchFamily="49" charset="0"/>
+                <a:cs typeface="Arial" pitchFamily="34" charset="0"/>
+              </a:rPr>
+              <a:t>pico10.fasta 0.9052632 </a:t>
+            </a:r>
+          </a:p>
+          <a:p>
+            <a:pPr marL="171450" marR="0" lvl="0" indent="-171450" algn="l" defTabSz="914400" rtl="0" eaLnBrk="1" fontAlgn="base" latinLnBrk="0" hangingPunct="1">
+              <a:lnSpc>
+                <a:spcPct val="100000"/>
+              </a:lnSpc>
+              <a:spcBef>
+                <a:spcPct val="0"/>
+              </a:spcBef>
+              <a:spcAft>
+                <a:spcPct val="0"/>
+              </a:spcAft>
+              <a:buClrTx/>
+              <a:buSzTx/>
+              <a:buFont typeface="Wingdings" pitchFamily="2" charset="2"/>
+              <a:buChar char="Ø"/>
+              <a:tabLst/>
+            </a:pPr>
+            <a:r>
+              <a:rPr kumimoji="0" lang="en-US" altLang="en-US" sz="1200" b="0" i="0" u="none" strike="noStrike" cap="none" normalizeH="0" baseline="0" dirty="0" smtClean="0">
+                <a:ln>
+                  <a:noFill/>
+                </a:ln>
+                <a:solidFill>
+                  <a:srgbClr val="C5C8C6"/>
+                </a:solidFill>
+                <a:effectLst/>
+                <a:latin typeface="Lucida Console" pitchFamily="49" charset="0"/>
+                <a:cs typeface="Arial" pitchFamily="34" charset="0"/>
+              </a:rPr>
+              <a:t>pico20.fasta 0.9538462 </a:t>
+            </a:r>
+          </a:p>
+          <a:p>
+            <a:pPr marL="171450" marR="0" lvl="0" indent="-171450" algn="l" defTabSz="914400" rtl="0" eaLnBrk="1" fontAlgn="base" latinLnBrk="0" hangingPunct="1">
+              <a:lnSpc>
+                <a:spcPct val="100000"/>
+              </a:lnSpc>
+              <a:spcBef>
+                <a:spcPct val="0"/>
+              </a:spcBef>
+              <a:spcAft>
+                <a:spcPct val="0"/>
+              </a:spcAft>
+              <a:buClrTx/>
+              <a:buSzTx/>
+              <a:buFont typeface="Wingdings" pitchFamily="2" charset="2"/>
+              <a:buChar char="Ø"/>
+              <a:tabLst/>
+            </a:pPr>
+            <a:r>
+              <a:rPr kumimoji="0" lang="en-US" altLang="en-US" sz="1200" b="0" i="0" u="none" strike="noStrike" cap="none" normalizeH="0" baseline="0" dirty="0" smtClean="0">
+                <a:ln>
+                  <a:noFill/>
+                </a:ln>
+                <a:solidFill>
+                  <a:srgbClr val="C5C8C6"/>
+                </a:solidFill>
+                <a:effectLst/>
+                <a:latin typeface="Lucida Console" pitchFamily="49" charset="0"/>
+                <a:cs typeface="Arial" pitchFamily="34" charset="0"/>
+              </a:rPr>
+              <a:t>pico40.fasta 0.9759494 </a:t>
+            </a:r>
+          </a:p>
+          <a:p>
+            <a:pPr marL="171450" marR="0" lvl="0" indent="-171450" algn="l" defTabSz="914400" rtl="0" eaLnBrk="1" fontAlgn="base" latinLnBrk="0" hangingPunct="1">
+              <a:lnSpc>
+                <a:spcPct val="100000"/>
+              </a:lnSpc>
+              <a:spcBef>
+                <a:spcPct val="0"/>
+              </a:spcBef>
+              <a:spcAft>
+                <a:spcPct val="0"/>
+              </a:spcAft>
+              <a:buClrTx/>
+              <a:buSzTx/>
+              <a:buFont typeface="Wingdings" pitchFamily="2" charset="2"/>
+              <a:buChar char="Ø"/>
+              <a:tabLst/>
+            </a:pPr>
+            <a:r>
+              <a:rPr kumimoji="0" lang="en-US" altLang="en-US" sz="1200" b="0" i="0" u="none" strike="noStrike" cap="none" normalizeH="0" baseline="0" dirty="0" smtClean="0">
+                <a:ln>
+                  <a:noFill/>
+                </a:ln>
+                <a:solidFill>
+                  <a:srgbClr val="C5C8C6"/>
+                </a:solidFill>
+                <a:effectLst/>
+                <a:latin typeface="Lucida Console" pitchFamily="49" charset="0"/>
+                <a:cs typeface="Arial" pitchFamily="34" charset="0"/>
+              </a:rPr>
+              <a:t>pico80.fasta 1.0789308 </a:t>
+            </a:r>
+          </a:p>
+          <a:p>
+            <a:pPr marL="171450" indent="-171450">
+              <a:buFont typeface="Wingdings" pitchFamily="2" charset="2"/>
+              <a:buChar char="Ø"/>
+            </a:pPr>
+            <a:r>
+              <a:rPr lang="en-US" altLang="en-US" sz="1200" dirty="0">
+                <a:solidFill>
+                  <a:srgbClr val="C5C8C6"/>
+                </a:solidFill>
+                <a:latin typeface="Lucida Console" pitchFamily="49" charset="0"/>
+              </a:rPr>
+              <a:t>pico100.fasta 1.0578894 </a:t>
+            </a:r>
+          </a:p>
+          <a:p>
+            <a:pPr marL="171450" marR="0" lvl="0" indent="-171450" algn="l" defTabSz="914400" rtl="0" eaLnBrk="1" fontAlgn="base" latinLnBrk="0" hangingPunct="1">
+              <a:lnSpc>
+                <a:spcPct val="100000"/>
+              </a:lnSpc>
+              <a:spcBef>
+                <a:spcPct val="0"/>
+              </a:spcBef>
+              <a:spcAft>
+                <a:spcPct val="0"/>
+              </a:spcAft>
+              <a:buClrTx/>
+              <a:buSzTx/>
+              <a:buFont typeface="Wingdings" pitchFamily="2" charset="2"/>
+              <a:buChar char="Ø"/>
+              <a:tabLst/>
+            </a:pPr>
+            <a:r>
+              <a:rPr kumimoji="0" lang="en-US" altLang="en-US" sz="1200" b="0" i="0" u="none" strike="noStrike" cap="none" normalizeH="0" baseline="0" dirty="0" err="1" smtClean="0">
+                <a:ln>
+                  <a:noFill/>
+                </a:ln>
+                <a:solidFill>
+                  <a:srgbClr val="C5C8C6"/>
+                </a:solidFill>
+                <a:effectLst/>
+                <a:latin typeface="Lucida Console" pitchFamily="49" charset="0"/>
+                <a:cs typeface="Arial" pitchFamily="34" charset="0"/>
+              </a:rPr>
+              <a:t>PicoAligned.fasta</a:t>
+            </a:r>
+            <a:r>
+              <a:rPr kumimoji="0" lang="en-US" altLang="en-US" sz="1200" b="0" i="0" u="none" strike="noStrike" cap="none" normalizeH="0" baseline="0" dirty="0" smtClean="0">
+                <a:ln>
+                  <a:noFill/>
+                </a:ln>
+                <a:solidFill>
+                  <a:srgbClr val="C5C8C6"/>
+                </a:solidFill>
+                <a:effectLst/>
+                <a:latin typeface="Lucida Console" pitchFamily="49" charset="0"/>
+                <a:cs typeface="Arial" pitchFamily="34" charset="0"/>
+              </a:rPr>
+              <a:t> 1.0551834 </a:t>
+            </a:r>
+          </a:p>
+          <a:p>
+            <a:pPr marL="171450" marR="0" lvl="0" indent="-171450" algn="l" defTabSz="914400" rtl="0" eaLnBrk="1" fontAlgn="base" latinLnBrk="0" hangingPunct="1">
+              <a:lnSpc>
+                <a:spcPct val="100000"/>
+              </a:lnSpc>
+              <a:spcBef>
+                <a:spcPct val="0"/>
+              </a:spcBef>
+              <a:spcAft>
+                <a:spcPct val="0"/>
+              </a:spcAft>
+              <a:buClrTx/>
+              <a:buSzTx/>
+              <a:buFont typeface="Wingdings" pitchFamily="2" charset="2"/>
+              <a:buChar char="Ø"/>
+              <a:tabLst/>
+            </a:pPr>
+            <a:endParaRPr kumimoji="0" lang="en-US" altLang="en-US" sz="1200" b="0" i="0" u="none" strike="noStrike" cap="none" normalizeH="0" baseline="0" dirty="0" smtClean="0">
+              <a:ln>
+                <a:noFill/>
+              </a:ln>
+              <a:solidFill>
+                <a:srgbClr val="B294BB"/>
+              </a:solidFill>
+              <a:effectLst/>
+              <a:latin typeface="Lucida Console" pitchFamily="49" charset="0"/>
+              <a:cs typeface="Arial" pitchFamily="34" charset="0"/>
+            </a:endParaRPr>
+          </a:p>
+          <a:p>
+            <a:pPr marL="171450" marR="0" lvl="0" indent="-171450" algn="l" defTabSz="914400" rtl="0" eaLnBrk="1" fontAlgn="base" latinLnBrk="0" hangingPunct="1">
+              <a:lnSpc>
+                <a:spcPct val="100000"/>
+              </a:lnSpc>
+              <a:spcBef>
+                <a:spcPct val="0"/>
+              </a:spcBef>
+              <a:spcAft>
+                <a:spcPct val="0"/>
+              </a:spcAft>
+              <a:buClrTx/>
+              <a:buSzTx/>
+              <a:buFont typeface="Wingdings" pitchFamily="2" charset="2"/>
+              <a:buChar char="Ø"/>
+              <a:tabLst/>
+            </a:pPr>
+            <a:r>
+              <a:rPr kumimoji="0" lang="en-US" altLang="en-US" sz="1200" b="0" i="0" u="none" strike="noStrike" cap="none" normalizeH="0" baseline="0" dirty="0" smtClean="0">
+                <a:ln>
+                  <a:noFill/>
+                </a:ln>
+                <a:solidFill>
+                  <a:srgbClr val="B294BB"/>
+                </a:solidFill>
+                <a:effectLst/>
+                <a:latin typeface="Lucida Console" pitchFamily="49" charset="0"/>
+                <a:cs typeface="Arial" pitchFamily="34" charset="0"/>
+              </a:rPr>
+              <a:t>file2@Pi #also says is </a:t>
+            </a:r>
+            <a:r>
+              <a:rPr kumimoji="0" lang="en-US" altLang="en-US" sz="1200" b="0" i="0" u="none" strike="noStrike" cap="none" normalizeH="0" baseline="0" dirty="0" err="1" smtClean="0">
+                <a:ln>
+                  <a:noFill/>
+                </a:ln>
+                <a:solidFill>
+                  <a:srgbClr val="B294BB"/>
+                </a:solidFill>
+                <a:effectLst/>
+                <a:latin typeface="Lucida Console" pitchFamily="49" charset="0"/>
+                <a:cs typeface="Arial" pitchFamily="34" charset="0"/>
+              </a:rPr>
+              <a:t>Nei's</a:t>
+            </a:r>
+            <a:r>
+              <a:rPr kumimoji="0" lang="en-US" altLang="en-US" sz="1200" b="0" i="0" u="none" strike="noStrike" cap="none" normalizeH="0" baseline="0" dirty="0" smtClean="0">
+                <a:ln>
+                  <a:noFill/>
+                </a:ln>
+                <a:solidFill>
+                  <a:srgbClr val="B294BB"/>
+                </a:solidFill>
+                <a:effectLst/>
+                <a:latin typeface="Lucida Console" pitchFamily="49" charset="0"/>
+                <a:cs typeface="Arial" pitchFamily="34" charset="0"/>
+              </a:rPr>
+              <a:t> pi </a:t>
+            </a:r>
+            <a:r>
+              <a:rPr kumimoji="0" lang="en-US" altLang="en-US" sz="1200" b="0" i="0" u="none" strike="noStrike" cap="none" normalizeH="0" baseline="0" dirty="0" smtClean="0">
+                <a:ln>
+                  <a:noFill/>
+                </a:ln>
+                <a:solidFill>
+                  <a:srgbClr val="C5C8C6"/>
+                </a:solidFill>
+                <a:effectLst/>
+                <a:latin typeface="Lucida Console" pitchFamily="49" charset="0"/>
+                <a:cs typeface="Arial" pitchFamily="34" charset="0"/>
+              </a:rPr>
+              <a:t>pop 1 </a:t>
+            </a:r>
+          </a:p>
+          <a:p>
+            <a:pPr marL="171450" lvl="0" indent="-171450">
+              <a:buFont typeface="Wingdings" pitchFamily="2" charset="2"/>
+              <a:buChar char="Ø"/>
+            </a:pPr>
+            <a:r>
+              <a:rPr lang="en-US" altLang="en-US" sz="1200" dirty="0">
+                <a:solidFill>
+                  <a:srgbClr val="C5C8C6"/>
+                </a:solidFill>
+                <a:latin typeface="Lucida Console" pitchFamily="49" charset="0"/>
+              </a:rPr>
+              <a:t>pico5.fasta 5.511111</a:t>
+            </a:r>
+            <a:endParaRPr kumimoji="0" lang="en-US" altLang="en-US" sz="1200" b="0" i="0" u="none" strike="noStrike" cap="none" normalizeH="0" baseline="0" dirty="0" smtClean="0">
+              <a:ln>
+                <a:noFill/>
+              </a:ln>
+              <a:solidFill>
+                <a:srgbClr val="C5C8C6"/>
+              </a:solidFill>
+              <a:effectLst/>
+              <a:latin typeface="Lucida Console" pitchFamily="49" charset="0"/>
+              <a:cs typeface="Arial" pitchFamily="34" charset="0"/>
+            </a:endParaRPr>
+          </a:p>
+          <a:p>
+            <a:pPr marL="171450" marR="0" lvl="0" indent="-171450" algn="l" defTabSz="914400" rtl="0" eaLnBrk="1" fontAlgn="base" latinLnBrk="0" hangingPunct="1">
+              <a:lnSpc>
+                <a:spcPct val="100000"/>
+              </a:lnSpc>
+              <a:spcBef>
+                <a:spcPct val="0"/>
+              </a:spcBef>
+              <a:spcAft>
+                <a:spcPct val="0"/>
+              </a:spcAft>
+              <a:buClrTx/>
+              <a:buSzTx/>
+              <a:buFont typeface="Wingdings" pitchFamily="2" charset="2"/>
+              <a:buChar char="Ø"/>
+              <a:tabLst/>
+            </a:pPr>
+            <a:r>
+              <a:rPr kumimoji="0" lang="en-US" altLang="en-US" sz="1200" b="0" i="0" u="none" strike="noStrike" cap="none" normalizeH="0" baseline="0" dirty="0" smtClean="0">
+                <a:ln>
+                  <a:noFill/>
+                </a:ln>
+                <a:solidFill>
+                  <a:srgbClr val="C5C8C6"/>
+                </a:solidFill>
+                <a:effectLst/>
+                <a:latin typeface="Lucida Console" pitchFamily="49" charset="0"/>
+                <a:cs typeface="Arial" pitchFamily="34" charset="0"/>
+              </a:rPr>
+              <a:t>pico10.fasta 6.021053 </a:t>
+            </a:r>
+          </a:p>
+          <a:p>
+            <a:pPr marL="171450" marR="0" lvl="0" indent="-171450" algn="l" defTabSz="914400" rtl="0" eaLnBrk="1" fontAlgn="base" latinLnBrk="0" hangingPunct="1">
+              <a:lnSpc>
+                <a:spcPct val="100000"/>
+              </a:lnSpc>
+              <a:spcBef>
+                <a:spcPct val="0"/>
+              </a:spcBef>
+              <a:spcAft>
+                <a:spcPct val="0"/>
+              </a:spcAft>
+              <a:buClrTx/>
+              <a:buSzTx/>
+              <a:buFont typeface="Wingdings" pitchFamily="2" charset="2"/>
+              <a:buChar char="Ø"/>
+              <a:tabLst/>
+            </a:pPr>
+            <a:r>
+              <a:rPr kumimoji="0" lang="en-US" altLang="en-US" sz="1200" b="0" i="0" u="none" strike="noStrike" cap="none" normalizeH="0" baseline="0" dirty="0" smtClean="0">
+                <a:ln>
+                  <a:noFill/>
+                </a:ln>
+                <a:solidFill>
+                  <a:srgbClr val="C5C8C6"/>
+                </a:solidFill>
+                <a:effectLst/>
+                <a:latin typeface="Lucida Console" pitchFamily="49" charset="0"/>
+                <a:cs typeface="Arial" pitchFamily="34" charset="0"/>
+              </a:rPr>
+              <a:t>pico20.fasta 5.769231 </a:t>
+            </a:r>
+          </a:p>
+          <a:p>
+            <a:pPr marL="171450" marR="0" lvl="0" indent="-171450" algn="l" defTabSz="914400" rtl="0" eaLnBrk="1" fontAlgn="base" latinLnBrk="0" hangingPunct="1">
+              <a:lnSpc>
+                <a:spcPct val="100000"/>
+              </a:lnSpc>
+              <a:spcBef>
+                <a:spcPct val="0"/>
+              </a:spcBef>
+              <a:spcAft>
+                <a:spcPct val="0"/>
+              </a:spcAft>
+              <a:buClrTx/>
+              <a:buSzTx/>
+              <a:buFont typeface="Wingdings" pitchFamily="2" charset="2"/>
+              <a:buChar char="Ø"/>
+              <a:tabLst/>
+            </a:pPr>
+            <a:r>
+              <a:rPr kumimoji="0" lang="en-US" altLang="en-US" sz="1200" b="0" i="0" u="none" strike="noStrike" cap="none" normalizeH="0" baseline="0" dirty="0" smtClean="0">
+                <a:ln>
+                  <a:noFill/>
+                </a:ln>
+                <a:solidFill>
+                  <a:srgbClr val="C5C8C6"/>
+                </a:solidFill>
+                <a:effectLst/>
+                <a:latin typeface="Lucida Console" pitchFamily="49" charset="0"/>
+                <a:cs typeface="Arial" pitchFamily="34" charset="0"/>
+              </a:rPr>
+              <a:t>pico40.fasta 5.964557 </a:t>
+            </a:r>
+          </a:p>
+          <a:p>
+            <a:pPr marL="171450" marR="0" lvl="0" indent="-171450" algn="l" defTabSz="914400" rtl="0" eaLnBrk="1" fontAlgn="base" latinLnBrk="0" hangingPunct="1">
+              <a:lnSpc>
+                <a:spcPct val="100000"/>
+              </a:lnSpc>
+              <a:spcBef>
+                <a:spcPct val="0"/>
+              </a:spcBef>
+              <a:spcAft>
+                <a:spcPct val="0"/>
+              </a:spcAft>
+              <a:buClrTx/>
+              <a:buSzTx/>
+              <a:buFont typeface="Wingdings" pitchFamily="2" charset="2"/>
+              <a:buChar char="Ø"/>
+              <a:tabLst/>
+            </a:pPr>
+            <a:r>
+              <a:rPr kumimoji="0" lang="en-US" altLang="en-US" sz="1200" b="0" i="0" u="none" strike="noStrike" cap="none" normalizeH="0" baseline="0" dirty="0" smtClean="0">
+                <a:ln>
+                  <a:noFill/>
+                </a:ln>
+                <a:solidFill>
+                  <a:srgbClr val="C5C8C6"/>
+                </a:solidFill>
+                <a:effectLst/>
+                <a:latin typeface="Lucida Console" pitchFamily="49" charset="0"/>
+                <a:cs typeface="Arial" pitchFamily="34" charset="0"/>
+              </a:rPr>
+              <a:t> pico80.fasta 4.613522 </a:t>
+            </a:r>
+          </a:p>
+          <a:p>
+            <a:pPr marL="171450" indent="-171450">
+              <a:buFont typeface="Wingdings" pitchFamily="2" charset="2"/>
+              <a:buChar char="Ø"/>
+            </a:pPr>
+            <a:r>
+              <a:rPr lang="en-US" altLang="en-US" sz="1200" dirty="0">
+                <a:solidFill>
+                  <a:srgbClr val="C5C8C6"/>
+                </a:solidFill>
+                <a:latin typeface="Lucida Console" pitchFamily="49" charset="0"/>
+              </a:rPr>
+              <a:t>pico100.fasta 4.642412</a:t>
+            </a:r>
+          </a:p>
+          <a:p>
+            <a:pPr marL="171450" marR="0" lvl="0" indent="-171450" algn="l" defTabSz="914400" rtl="0" eaLnBrk="1" fontAlgn="base" latinLnBrk="0" hangingPunct="1">
+              <a:lnSpc>
+                <a:spcPct val="100000"/>
+              </a:lnSpc>
+              <a:spcBef>
+                <a:spcPct val="0"/>
+              </a:spcBef>
+              <a:spcAft>
+                <a:spcPct val="0"/>
+              </a:spcAft>
+              <a:buClrTx/>
+              <a:buSzTx/>
+              <a:buFont typeface="Wingdings" pitchFamily="2" charset="2"/>
+              <a:buChar char="Ø"/>
+              <a:tabLst/>
+            </a:pPr>
+            <a:r>
+              <a:rPr kumimoji="0" lang="en-US" altLang="en-US" sz="1200" b="0" i="0" u="none" strike="noStrike" cap="none" normalizeH="0" baseline="0" dirty="0" err="1" smtClean="0">
+                <a:ln>
+                  <a:noFill/>
+                </a:ln>
+                <a:solidFill>
+                  <a:srgbClr val="C5C8C6"/>
+                </a:solidFill>
+                <a:effectLst/>
+                <a:latin typeface="Lucida Console" pitchFamily="49" charset="0"/>
+                <a:cs typeface="Arial" pitchFamily="34" charset="0"/>
+              </a:rPr>
+              <a:t>PicoAligned.fasta</a:t>
+            </a:r>
+            <a:r>
+              <a:rPr kumimoji="0" lang="en-US" altLang="en-US" sz="1200" b="0" i="0" u="none" strike="noStrike" cap="none" normalizeH="0" baseline="0" dirty="0" smtClean="0">
+                <a:ln>
+                  <a:noFill/>
+                </a:ln>
+                <a:solidFill>
+                  <a:srgbClr val="C5C8C6"/>
+                </a:solidFill>
+                <a:effectLst/>
+                <a:latin typeface="Lucida Console" pitchFamily="49" charset="0"/>
+                <a:cs typeface="Arial" pitchFamily="34" charset="0"/>
+              </a:rPr>
+              <a:t> 4.763545</a:t>
+            </a:r>
+            <a:endParaRPr kumimoji="0" lang="en-US" altLang="en-US" sz="1800" b="0" i="0" u="none" strike="noStrike" cap="none" normalizeH="0" baseline="0" dirty="0" smtClean="0">
+              <a:ln>
+                <a:noFill/>
+              </a:ln>
+              <a:solidFill>
+                <a:schemeClr val="tx1"/>
+              </a:solidFill>
+              <a:effectLst/>
+              <a:latin typeface="Arial" pitchFamily="34" charset="0"/>
+              <a:cs typeface="Arial" pitchFamily="34" charset="0"/>
+            </a:endParaRPr>
+          </a:p>
+        </p:txBody>
+      </p:sp>
+      <p:sp>
+        <p:nvSpPr>
+          <p:cNvPr id="4" name="3 Título"/>
+          <p:cNvSpPr>
+            <a:spLocks noGrp="1"/>
+          </p:cNvSpPr>
+          <p:nvPr>
+            <p:ph type="title"/>
+          </p:nvPr>
+        </p:nvSpPr>
+        <p:spPr/>
+        <p:txBody>
+          <a:bodyPr>
+            <a:normAutofit fontScale="90000"/>
+          </a:bodyPr>
+          <a:lstStyle/>
+          <a:p>
+            <a:r>
+              <a:rPr lang="en-US" dirty="0" smtClean="0"/>
+              <a:t>Comparing Pi and H from 2 modules</a:t>
+            </a:r>
+            <a:endParaRPr lang="en-US" dirty="0"/>
+          </a:p>
+        </p:txBody>
+      </p:sp>
+      <p:sp>
+        <p:nvSpPr>
+          <p:cNvPr id="5" name="4 CuadroTexto"/>
+          <p:cNvSpPr txBox="1"/>
+          <p:nvPr/>
+        </p:nvSpPr>
+        <p:spPr>
+          <a:xfrm>
+            <a:off x="1259632" y="5229200"/>
+            <a:ext cx="6480720" cy="646331"/>
+          </a:xfrm>
+          <a:prstGeom prst="rect">
+            <a:avLst/>
+          </a:prstGeom>
+          <a:noFill/>
+        </p:spPr>
+        <p:txBody>
+          <a:bodyPr wrap="square" rtlCol="0">
+            <a:spAutoFit/>
+          </a:bodyPr>
+          <a:lstStyle/>
+          <a:p>
+            <a:r>
+              <a:rPr lang="en-US" dirty="0" smtClean="0"/>
+              <a:t>The differences between modules increases with sample size, with n of 5 or 10 the values are identical with the two modules</a:t>
+            </a:r>
+            <a:endParaRPr lang="en-US" dirty="0"/>
+          </a:p>
+        </p:txBody>
+      </p:sp>
+    </p:spTree>
+    <p:extLst>
+      <p:ext uri="{BB962C8B-B14F-4D97-AF65-F5344CB8AC3E}">
+        <p14:creationId xmlns:p14="http://schemas.microsoft.com/office/powerpoint/2010/main" val="840791111"/>
       </p:ext>
     </p:extLst>
   </p:cSld>

</xml_diff>

<commit_message>
Working in the haplotypes problem
</commit_message>
<xml_diff>
--- a/simulation thoughts.pptx
+++ b/simulation thoughts.pptx
@@ -14,6 +14,7 @@
     <p:sldId id="258" r:id="rId8"/>
     <p:sldId id="263" r:id="rId9"/>
     <p:sldId id="264" r:id="rId10"/>
+    <p:sldId id="265" r:id="rId11"/>
   </p:sldIdLst>
   <p:sldSz cx="9144000" cy="6858000" type="screen4x3"/>
   <p:notesSz cx="6858000" cy="9144000"/>
@@ -296,7 +297,7 @@
           <a:p>
             <a:fld id="{F4EBF145-DA63-42BF-AC08-4F1ED58EAB64}" type="datetimeFigureOut">
               <a:rPr lang="en-US" smtClean="0"/>
-              <a:t>4/16/2015</a:t>
+              <a:t>4/21/2015</a:t>
             </a:fld>
             <a:endParaRPr lang="en-US"/>
           </a:p>
@@ -466,7 +467,7 @@
           <a:p>
             <a:fld id="{F4EBF145-DA63-42BF-AC08-4F1ED58EAB64}" type="datetimeFigureOut">
               <a:rPr lang="en-US" smtClean="0"/>
-              <a:t>4/16/2015</a:t>
+              <a:t>4/21/2015</a:t>
             </a:fld>
             <a:endParaRPr lang="en-US"/>
           </a:p>
@@ -646,7 +647,7 @@
           <a:p>
             <a:fld id="{F4EBF145-DA63-42BF-AC08-4F1ED58EAB64}" type="datetimeFigureOut">
               <a:rPr lang="en-US" smtClean="0"/>
-              <a:t>4/16/2015</a:t>
+              <a:t>4/21/2015</a:t>
             </a:fld>
             <a:endParaRPr lang="en-US"/>
           </a:p>
@@ -816,7 +817,7 @@
           <a:p>
             <a:fld id="{F4EBF145-DA63-42BF-AC08-4F1ED58EAB64}" type="datetimeFigureOut">
               <a:rPr lang="en-US" smtClean="0"/>
-              <a:t>4/16/2015</a:t>
+              <a:t>4/21/2015</a:t>
             </a:fld>
             <a:endParaRPr lang="en-US"/>
           </a:p>
@@ -1062,7 +1063,7 @@
           <a:p>
             <a:fld id="{F4EBF145-DA63-42BF-AC08-4F1ED58EAB64}" type="datetimeFigureOut">
               <a:rPr lang="en-US" smtClean="0"/>
-              <a:t>4/16/2015</a:t>
+              <a:t>4/21/2015</a:t>
             </a:fld>
             <a:endParaRPr lang="en-US"/>
           </a:p>
@@ -1350,7 +1351,7 @@
           <a:p>
             <a:fld id="{F4EBF145-DA63-42BF-AC08-4F1ED58EAB64}" type="datetimeFigureOut">
               <a:rPr lang="en-US" smtClean="0"/>
-              <a:t>4/16/2015</a:t>
+              <a:t>4/21/2015</a:t>
             </a:fld>
             <a:endParaRPr lang="en-US"/>
           </a:p>
@@ -1772,7 +1773,7 @@
           <a:p>
             <a:fld id="{F4EBF145-DA63-42BF-AC08-4F1ED58EAB64}" type="datetimeFigureOut">
               <a:rPr lang="en-US" smtClean="0"/>
-              <a:t>4/16/2015</a:t>
+              <a:t>4/21/2015</a:t>
             </a:fld>
             <a:endParaRPr lang="en-US"/>
           </a:p>
@@ -1890,7 +1891,7 @@
           <a:p>
             <a:fld id="{F4EBF145-DA63-42BF-AC08-4F1ED58EAB64}" type="datetimeFigureOut">
               <a:rPr lang="en-US" smtClean="0"/>
-              <a:t>4/16/2015</a:t>
+              <a:t>4/21/2015</a:t>
             </a:fld>
             <a:endParaRPr lang="en-US"/>
           </a:p>
@@ -1985,7 +1986,7 @@
           <a:p>
             <a:fld id="{F4EBF145-DA63-42BF-AC08-4F1ED58EAB64}" type="datetimeFigureOut">
               <a:rPr lang="en-US" smtClean="0"/>
-              <a:t>4/16/2015</a:t>
+              <a:t>4/21/2015</a:t>
             </a:fld>
             <a:endParaRPr lang="en-US"/>
           </a:p>
@@ -2262,7 +2263,7 @@
           <a:p>
             <a:fld id="{F4EBF145-DA63-42BF-AC08-4F1ED58EAB64}" type="datetimeFigureOut">
               <a:rPr lang="en-US" smtClean="0"/>
-              <a:t>4/16/2015</a:t>
+              <a:t>4/21/2015</a:t>
             </a:fld>
             <a:endParaRPr lang="en-US"/>
           </a:p>
@@ -2515,7 +2516,7 @@
           <a:p>
             <a:fld id="{F4EBF145-DA63-42BF-AC08-4F1ED58EAB64}" type="datetimeFigureOut">
               <a:rPr lang="en-US" smtClean="0"/>
-              <a:t>4/16/2015</a:t>
+              <a:t>4/21/2015</a:t>
             </a:fld>
             <a:endParaRPr lang="en-US"/>
           </a:p>
@@ -2728,7 +2729,7 @@
           <a:p>
             <a:fld id="{F4EBF145-DA63-42BF-AC08-4F1ED58EAB64}" type="datetimeFigureOut">
               <a:rPr lang="en-US" smtClean="0"/>
-              <a:t>4/16/2015</a:t>
+              <a:t>4/21/2015</a:t>
             </a:fld>
             <a:endParaRPr lang="en-US"/>
           </a:p>
@@ -3143,11 +3144,7 @@
           <a:p>
             <a:r>
               <a:rPr lang="en-US" dirty="0" smtClean="0"/>
-              <a:t>To have a record of things we </a:t>
-            </a:r>
-            <a:r>
-              <a:rPr lang="en-US" dirty="0" smtClean="0"/>
-              <a:t>tried, or funny things with the code</a:t>
+              <a:t>To have a record of things we tried, or funny things with the code</a:t>
             </a:r>
             <a:endParaRPr lang="en-US" dirty="0"/>
           </a:p>
@@ -3157,6 +3154,842 @@
     <p:extLst>
       <p:ext uri="{BB962C8B-B14F-4D97-AF65-F5344CB8AC3E}">
         <p14:creationId xmlns:p14="http://schemas.microsoft.com/office/powerpoint/2010/main" val="3810633235"/>
+      </p:ext>
+    </p:extLst>
+  </p:cSld>
+  <p:clrMapOvr>
+    <a:masterClrMapping/>
+  </p:clrMapOvr>
+</p:sld>
+</file>
+
+<file path=ppt/slides/slide10.xml><?xml version="1.0" encoding="utf-8"?>
+<p:sld xmlns:a="http://schemas.openxmlformats.org/drawingml/2006/main" xmlns:r="http://schemas.openxmlformats.org/officeDocument/2006/relationships" xmlns:p="http://schemas.openxmlformats.org/presentationml/2006/main">
+  <p:cSld>
+    <p:spTree>
+      <p:nvGrpSpPr>
+        <p:cNvPr id="1" name=""/>
+        <p:cNvGrpSpPr/>
+        <p:nvPr/>
+      </p:nvGrpSpPr>
+      <p:grpSpPr>
+        <a:xfrm>
+          <a:off x="0" y="0"/>
+          <a:ext cx="0" cy="0"/>
+          <a:chOff x="0" y="0"/>
+          <a:chExt cx="0" cy="0"/>
+        </a:xfrm>
+      </p:grpSpPr>
+      <p:sp>
+        <p:nvSpPr>
+          <p:cNvPr id="2" name="1 Título"/>
+          <p:cNvSpPr>
+            <a:spLocks noGrp="1"/>
+          </p:cNvSpPr>
+          <p:nvPr>
+            <p:ph type="title"/>
+          </p:nvPr>
+        </p:nvSpPr>
+        <p:spPr/>
+        <p:txBody>
+          <a:bodyPr/>
+          <a:lstStyle/>
+          <a:p>
+            <a:r>
+              <a:rPr lang="en-US" dirty="0" smtClean="0"/>
+              <a:t>Reading MS data</a:t>
+            </a:r>
+            <a:endParaRPr lang="en-US" dirty="0"/>
+          </a:p>
+        </p:txBody>
+      </p:sp>
+      <p:sp>
+        <p:nvSpPr>
+          <p:cNvPr id="3" name="2 CuadroTexto"/>
+          <p:cNvSpPr txBox="1"/>
+          <p:nvPr/>
+        </p:nvSpPr>
+        <p:spPr>
+          <a:xfrm>
+            <a:off x="272786" y="1556793"/>
+            <a:ext cx="8568952" cy="461665"/>
+          </a:xfrm>
+          <a:prstGeom prst="rect">
+            <a:avLst/>
+          </a:prstGeom>
+          <a:noFill/>
+        </p:spPr>
+        <p:txBody>
+          <a:bodyPr wrap="square" rtlCol="0">
+            <a:spAutoFit/>
+          </a:bodyPr>
+          <a:lstStyle/>
+          <a:p>
+            <a:pPr algn="ctr"/>
+            <a:r>
+              <a:rPr lang="en-US" sz="2400" dirty="0" err="1" smtClean="0"/>
+              <a:t>readMS</a:t>
+            </a:r>
+            <a:r>
+              <a:rPr lang="en-US" sz="2400" dirty="0" smtClean="0"/>
+              <a:t> (</a:t>
+            </a:r>
+            <a:r>
+              <a:rPr lang="en-US" sz="2400" dirty="0" err="1" smtClean="0"/>
+              <a:t>popGenome</a:t>
+            </a:r>
+            <a:r>
+              <a:rPr lang="en-US" sz="2400" dirty="0" smtClean="0"/>
+              <a:t>) 		</a:t>
+            </a:r>
+            <a:r>
+              <a:rPr lang="en-US" sz="2400" dirty="0" err="1" smtClean="0"/>
+              <a:t>read.ms.output</a:t>
+            </a:r>
+            <a:r>
+              <a:rPr lang="en-US" sz="2400" dirty="0" smtClean="0"/>
+              <a:t> (gap)</a:t>
+            </a:r>
+            <a:endParaRPr lang="en-US" sz="2400" dirty="0"/>
+          </a:p>
+        </p:txBody>
+      </p:sp>
+      <p:sp>
+        <p:nvSpPr>
+          <p:cNvPr id="5" name="Rectangle 1"/>
+          <p:cNvSpPr>
+            <a:spLocks noChangeArrowheads="1"/>
+          </p:cNvSpPr>
+          <p:nvPr/>
+        </p:nvSpPr>
+        <p:spPr bwMode="auto">
+          <a:xfrm>
+            <a:off x="5004048" y="3073603"/>
+            <a:ext cx="3727700" cy="1723549"/>
+          </a:xfrm>
+          <a:prstGeom prst="rect">
+            <a:avLst/>
+          </a:prstGeom>
+          <a:solidFill>
+            <a:srgbClr val="1D1F21"/>
+          </a:solidFill>
+          <a:ln>
+            <a:noFill/>
+          </a:ln>
+          <a:effectLst/>
+          <a:extLst>
+            <a:ext uri="{91240B29-F687-4F45-9708-019B960494DF}">
+              <a14:hiddenLine xmlns:a14="http://schemas.microsoft.com/office/drawing/2010/main" w="9525">
+                <a:solidFill>
+                  <a:schemeClr val="tx1"/>
+                </a:solidFill>
+                <a:miter lim="800000"/>
+                <a:headEnd/>
+                <a:tailEnd/>
+              </a14:hiddenLine>
+            </a:ext>
+            <a:ext uri="{AF507438-7753-43E0-B8FC-AC1667EBCBE1}">
+              <a14:hiddenEffects xmlns:a14="http://schemas.microsoft.com/office/drawing/2010/main">
+                <a:effectLst>
+                  <a:outerShdw dist="35921" dir="2700000" algn="ctr" rotWithShape="0">
+                    <a:schemeClr val="bg2"/>
+                  </a:outerShdw>
+                </a:effectLst>
+              </a14:hiddenEffects>
+            </a:ext>
+          </a:extLst>
+        </p:spPr>
+        <p:txBody>
+          <a:bodyPr vert="horz" wrap="square" lIns="0" tIns="0" rIns="0" bIns="0" numCol="1" anchor="ctr" anchorCtr="0" compatLnSpc="1">
+            <a:prstTxWarp prst="textNoShape">
+              <a:avLst/>
+            </a:prstTxWarp>
+            <a:spAutoFit/>
+          </a:bodyPr>
+          <a:lstStyle>
+            <a:lvl1pPr fontAlgn="base">
+              <a:spcBef>
+                <a:spcPct val="0"/>
+              </a:spcBef>
+              <a:spcAft>
+                <a:spcPct val="0"/>
+              </a:spcAft>
+              <a:defRPr>
+                <a:solidFill>
+                  <a:schemeClr val="tx1"/>
+                </a:solidFill>
+                <a:latin typeface="Arial" pitchFamily="34" charset="0"/>
+                <a:cs typeface="Arial" pitchFamily="34" charset="0"/>
+              </a:defRPr>
+            </a:lvl1pPr>
+            <a:lvl2pPr fontAlgn="base">
+              <a:spcBef>
+                <a:spcPct val="0"/>
+              </a:spcBef>
+              <a:spcAft>
+                <a:spcPct val="0"/>
+              </a:spcAft>
+              <a:defRPr>
+                <a:solidFill>
+                  <a:schemeClr val="tx1"/>
+                </a:solidFill>
+                <a:latin typeface="Arial" pitchFamily="34" charset="0"/>
+                <a:cs typeface="Arial" pitchFamily="34" charset="0"/>
+              </a:defRPr>
+            </a:lvl2pPr>
+            <a:lvl3pPr fontAlgn="base">
+              <a:spcBef>
+                <a:spcPct val="0"/>
+              </a:spcBef>
+              <a:spcAft>
+                <a:spcPct val="0"/>
+              </a:spcAft>
+              <a:defRPr>
+                <a:solidFill>
+                  <a:schemeClr val="tx1"/>
+                </a:solidFill>
+                <a:latin typeface="Arial" pitchFamily="34" charset="0"/>
+                <a:cs typeface="Arial" pitchFamily="34" charset="0"/>
+              </a:defRPr>
+            </a:lvl3pPr>
+            <a:lvl4pPr fontAlgn="base">
+              <a:spcBef>
+                <a:spcPct val="0"/>
+              </a:spcBef>
+              <a:spcAft>
+                <a:spcPct val="0"/>
+              </a:spcAft>
+              <a:defRPr>
+                <a:solidFill>
+                  <a:schemeClr val="tx1"/>
+                </a:solidFill>
+                <a:latin typeface="Arial" pitchFamily="34" charset="0"/>
+                <a:cs typeface="Arial" pitchFamily="34" charset="0"/>
+              </a:defRPr>
+            </a:lvl4pPr>
+            <a:lvl5pPr fontAlgn="base">
+              <a:spcBef>
+                <a:spcPct val="0"/>
+              </a:spcBef>
+              <a:spcAft>
+                <a:spcPct val="0"/>
+              </a:spcAft>
+              <a:defRPr>
+                <a:solidFill>
+                  <a:schemeClr val="tx1"/>
+                </a:solidFill>
+                <a:latin typeface="Arial" pitchFamily="34" charset="0"/>
+                <a:cs typeface="Arial" pitchFamily="34" charset="0"/>
+              </a:defRPr>
+            </a:lvl5pPr>
+            <a:lvl6pPr fontAlgn="base">
+              <a:spcBef>
+                <a:spcPct val="0"/>
+              </a:spcBef>
+              <a:spcAft>
+                <a:spcPct val="0"/>
+              </a:spcAft>
+              <a:defRPr>
+                <a:solidFill>
+                  <a:schemeClr val="tx1"/>
+                </a:solidFill>
+                <a:latin typeface="Arial" pitchFamily="34" charset="0"/>
+                <a:cs typeface="Arial" pitchFamily="34" charset="0"/>
+              </a:defRPr>
+            </a:lvl6pPr>
+            <a:lvl7pPr fontAlgn="base">
+              <a:spcBef>
+                <a:spcPct val="0"/>
+              </a:spcBef>
+              <a:spcAft>
+                <a:spcPct val="0"/>
+              </a:spcAft>
+              <a:defRPr>
+                <a:solidFill>
+                  <a:schemeClr val="tx1"/>
+                </a:solidFill>
+                <a:latin typeface="Arial" pitchFamily="34" charset="0"/>
+                <a:cs typeface="Arial" pitchFamily="34" charset="0"/>
+              </a:defRPr>
+            </a:lvl7pPr>
+            <a:lvl8pPr fontAlgn="base">
+              <a:spcBef>
+                <a:spcPct val="0"/>
+              </a:spcBef>
+              <a:spcAft>
+                <a:spcPct val="0"/>
+              </a:spcAft>
+              <a:defRPr>
+                <a:solidFill>
+                  <a:schemeClr val="tx1"/>
+                </a:solidFill>
+                <a:latin typeface="Arial" pitchFamily="34" charset="0"/>
+                <a:cs typeface="Arial" pitchFamily="34" charset="0"/>
+              </a:defRPr>
+            </a:lvl8pPr>
+            <a:lvl9pPr fontAlgn="base">
+              <a:spcBef>
+                <a:spcPct val="0"/>
+              </a:spcBef>
+              <a:spcAft>
+                <a:spcPct val="0"/>
+              </a:spcAft>
+              <a:defRPr>
+                <a:solidFill>
+                  <a:schemeClr val="tx1"/>
+                </a:solidFill>
+                <a:latin typeface="Arial" pitchFamily="34" charset="0"/>
+                <a:cs typeface="Arial" pitchFamily="34" charset="0"/>
+              </a:defRPr>
+            </a:lvl9pPr>
+          </a:lstStyle>
+          <a:p>
+            <a:pPr marL="0" marR="0" lvl="0" indent="0" algn="l" defTabSz="914400" rtl="0" eaLnBrk="1" fontAlgn="base" latinLnBrk="0" hangingPunct="1">
+              <a:lnSpc>
+                <a:spcPct val="100000"/>
+              </a:lnSpc>
+              <a:spcBef>
+                <a:spcPct val="0"/>
+              </a:spcBef>
+              <a:spcAft>
+                <a:spcPct val="0"/>
+              </a:spcAft>
+              <a:buClrTx/>
+              <a:buSzTx/>
+              <a:buFontTx/>
+              <a:buNone/>
+              <a:tabLst/>
+            </a:pPr>
+            <a:r>
+              <a:rPr kumimoji="0" lang="en-US" altLang="en-US" sz="1400" b="0" i="0" u="none" strike="noStrike" cap="none" normalizeH="0" baseline="0" dirty="0" smtClean="0">
+                <a:ln>
+                  <a:noFill/>
+                </a:ln>
+                <a:solidFill>
+                  <a:srgbClr val="C5C8C6"/>
+                </a:solidFill>
+                <a:effectLst/>
+                <a:latin typeface="Lucida Console" pitchFamily="49" charset="0"/>
+                <a:cs typeface="Arial" pitchFamily="34" charset="0"/>
+              </a:rPr>
+              <a:t>List of 9 </a:t>
+            </a:r>
+          </a:p>
+          <a:p>
+            <a:pPr marL="0" marR="0" lvl="0" indent="0" algn="l" defTabSz="914400" rtl="0" eaLnBrk="1" fontAlgn="base" latinLnBrk="0" hangingPunct="1">
+              <a:lnSpc>
+                <a:spcPct val="100000"/>
+              </a:lnSpc>
+              <a:spcBef>
+                <a:spcPct val="0"/>
+              </a:spcBef>
+              <a:spcAft>
+                <a:spcPct val="0"/>
+              </a:spcAft>
+              <a:buClrTx/>
+              <a:buSzTx/>
+              <a:buFontTx/>
+              <a:buNone/>
+              <a:tabLst/>
+            </a:pPr>
+            <a:r>
+              <a:rPr kumimoji="0" lang="en-US" altLang="en-US" sz="1400" b="0" i="0" u="none" strike="noStrike" cap="none" normalizeH="0" baseline="0" dirty="0" smtClean="0">
+                <a:ln>
+                  <a:noFill/>
+                </a:ln>
+                <a:solidFill>
+                  <a:srgbClr val="C5C8C6"/>
+                </a:solidFill>
+                <a:effectLst/>
+                <a:latin typeface="Lucida Console" pitchFamily="49" charset="0"/>
+                <a:cs typeface="Arial" pitchFamily="34" charset="0"/>
+              </a:rPr>
+              <a:t>$ call : </a:t>
+            </a:r>
+            <a:r>
+              <a:rPr kumimoji="0" lang="en-US" altLang="en-US" sz="1400" b="0" i="0" u="none" strike="noStrike" cap="none" normalizeH="0" baseline="0" dirty="0" err="1" smtClean="0">
+                <a:ln>
+                  <a:noFill/>
+                </a:ln>
+                <a:solidFill>
+                  <a:srgbClr val="C5C8C6"/>
+                </a:solidFill>
+                <a:effectLst/>
+                <a:latin typeface="Lucida Console" pitchFamily="49" charset="0"/>
+                <a:cs typeface="Arial" pitchFamily="34" charset="0"/>
+              </a:rPr>
+              <a:t>chr</a:t>
+            </a:r>
+            <a:r>
+              <a:rPr kumimoji="0" lang="en-US" altLang="en-US" sz="1400" b="0" i="0" u="none" strike="noStrike" cap="none" normalizeH="0" baseline="0" dirty="0" smtClean="0">
+                <a:ln>
+                  <a:noFill/>
+                </a:ln>
+                <a:solidFill>
+                  <a:srgbClr val="C5C8C6"/>
+                </a:solidFill>
+                <a:effectLst/>
+                <a:latin typeface="Lucida Console" pitchFamily="49" charset="0"/>
+                <a:cs typeface="Arial" pitchFamily="34" charset="0"/>
+              </a:rPr>
+              <a:t> "ms.exe 38 10 -t 1.5190" </a:t>
+            </a:r>
+          </a:p>
+          <a:p>
+            <a:pPr marL="0" marR="0" lvl="0" indent="0" algn="l" defTabSz="914400" rtl="0" eaLnBrk="1" fontAlgn="base" latinLnBrk="0" hangingPunct="1">
+              <a:lnSpc>
+                <a:spcPct val="100000"/>
+              </a:lnSpc>
+              <a:spcBef>
+                <a:spcPct val="0"/>
+              </a:spcBef>
+              <a:spcAft>
+                <a:spcPct val="0"/>
+              </a:spcAft>
+              <a:buClrTx/>
+              <a:buSzTx/>
+              <a:buFontTx/>
+              <a:buNone/>
+              <a:tabLst/>
+            </a:pPr>
+            <a:r>
+              <a:rPr kumimoji="0" lang="en-US" altLang="en-US" sz="1400" b="0" i="0" u="none" strike="noStrike" cap="none" normalizeH="0" baseline="0" dirty="0" smtClean="0">
+                <a:ln>
+                  <a:noFill/>
+                </a:ln>
+                <a:solidFill>
+                  <a:srgbClr val="C5C8C6"/>
+                </a:solidFill>
+                <a:effectLst/>
+                <a:latin typeface="Lucida Console" pitchFamily="49" charset="0"/>
+                <a:cs typeface="Arial" pitchFamily="34" charset="0"/>
+              </a:rPr>
+              <a:t>$ seed : </a:t>
+            </a:r>
+            <a:r>
+              <a:rPr kumimoji="0" lang="en-US" altLang="en-US" sz="1400" b="0" i="0" u="none" strike="noStrike" cap="none" normalizeH="0" baseline="0" dirty="0" err="1" smtClean="0">
+                <a:ln>
+                  <a:noFill/>
+                </a:ln>
+                <a:solidFill>
+                  <a:srgbClr val="C5C8C6"/>
+                </a:solidFill>
+                <a:effectLst/>
+                <a:latin typeface="Lucida Console" pitchFamily="49" charset="0"/>
+                <a:cs typeface="Arial" pitchFamily="34" charset="0"/>
+              </a:rPr>
+              <a:t>num</a:t>
+            </a:r>
+            <a:r>
+              <a:rPr kumimoji="0" lang="en-US" altLang="en-US" sz="1400" b="0" i="0" u="none" strike="noStrike" cap="none" normalizeH="0" baseline="0" dirty="0" smtClean="0">
+                <a:ln>
+                  <a:noFill/>
+                </a:ln>
+                <a:solidFill>
+                  <a:srgbClr val="C5C8C6"/>
+                </a:solidFill>
+                <a:effectLst/>
+                <a:latin typeface="Lucida Console" pitchFamily="49" charset="0"/>
+                <a:cs typeface="Arial" pitchFamily="34" charset="0"/>
+              </a:rPr>
+              <a:t> 21538 </a:t>
+            </a:r>
+          </a:p>
+          <a:p>
+            <a:pPr marL="0" marR="0" lvl="0" indent="0" algn="l" defTabSz="914400" rtl="0" eaLnBrk="1" fontAlgn="base" latinLnBrk="0" hangingPunct="1">
+              <a:lnSpc>
+                <a:spcPct val="100000"/>
+              </a:lnSpc>
+              <a:spcBef>
+                <a:spcPct val="0"/>
+              </a:spcBef>
+              <a:spcAft>
+                <a:spcPct val="0"/>
+              </a:spcAft>
+              <a:buClrTx/>
+              <a:buSzTx/>
+              <a:buFontTx/>
+              <a:buNone/>
+              <a:tabLst/>
+            </a:pPr>
+            <a:r>
+              <a:rPr kumimoji="0" lang="en-US" altLang="en-US" sz="1400" b="0" i="0" u="none" strike="noStrike" cap="none" normalizeH="0" baseline="0" dirty="0" smtClean="0">
+                <a:ln>
+                  <a:noFill/>
+                </a:ln>
+                <a:solidFill>
+                  <a:srgbClr val="C5C8C6"/>
+                </a:solidFill>
+                <a:effectLst/>
+                <a:latin typeface="Lucida Console" pitchFamily="49" charset="0"/>
+                <a:cs typeface="Arial" pitchFamily="34" charset="0"/>
+              </a:rPr>
+              <a:t>$ </a:t>
+            </a:r>
+            <a:r>
+              <a:rPr kumimoji="0" lang="en-US" altLang="en-US" sz="1400" b="0" i="0" u="none" strike="noStrike" cap="none" normalizeH="0" baseline="0" dirty="0" err="1" smtClean="0">
+                <a:ln>
+                  <a:noFill/>
+                </a:ln>
+                <a:solidFill>
+                  <a:srgbClr val="C5C8C6"/>
+                </a:solidFill>
+                <a:effectLst/>
+                <a:latin typeface="Lucida Console" pitchFamily="49" charset="0"/>
+                <a:cs typeface="Arial" pitchFamily="34" charset="0"/>
+              </a:rPr>
+              <a:t>nsam</a:t>
+            </a:r>
+            <a:r>
+              <a:rPr kumimoji="0" lang="en-US" altLang="en-US" sz="1400" b="0" i="0" u="none" strike="noStrike" cap="none" normalizeH="0" baseline="0" dirty="0" smtClean="0">
+                <a:ln>
+                  <a:noFill/>
+                </a:ln>
+                <a:solidFill>
+                  <a:srgbClr val="C5C8C6"/>
+                </a:solidFill>
+                <a:effectLst/>
+                <a:latin typeface="Lucida Console" pitchFamily="49" charset="0"/>
+                <a:cs typeface="Arial" pitchFamily="34" charset="0"/>
+              </a:rPr>
+              <a:t> : </a:t>
+            </a:r>
+            <a:r>
+              <a:rPr kumimoji="0" lang="en-US" altLang="en-US" sz="1400" b="0" i="0" u="none" strike="noStrike" cap="none" normalizeH="0" baseline="0" dirty="0" err="1" smtClean="0">
+                <a:ln>
+                  <a:noFill/>
+                </a:ln>
+                <a:solidFill>
+                  <a:srgbClr val="C5C8C6"/>
+                </a:solidFill>
+                <a:effectLst/>
+                <a:latin typeface="Lucida Console" pitchFamily="49" charset="0"/>
+                <a:cs typeface="Arial" pitchFamily="34" charset="0"/>
+              </a:rPr>
+              <a:t>int</a:t>
+            </a:r>
+            <a:r>
+              <a:rPr kumimoji="0" lang="en-US" altLang="en-US" sz="1400" b="0" i="0" u="none" strike="noStrike" cap="none" normalizeH="0" baseline="0" dirty="0" smtClean="0">
+                <a:ln>
+                  <a:noFill/>
+                </a:ln>
+                <a:solidFill>
+                  <a:srgbClr val="C5C8C6"/>
+                </a:solidFill>
+                <a:effectLst/>
+                <a:latin typeface="Lucida Console" pitchFamily="49" charset="0"/>
+                <a:cs typeface="Arial" pitchFamily="34" charset="0"/>
+              </a:rPr>
+              <a:t> 38 </a:t>
+            </a:r>
+          </a:p>
+          <a:p>
+            <a:pPr marL="0" marR="0" lvl="0" indent="0" algn="l" defTabSz="914400" rtl="0" eaLnBrk="1" fontAlgn="base" latinLnBrk="0" hangingPunct="1">
+              <a:lnSpc>
+                <a:spcPct val="100000"/>
+              </a:lnSpc>
+              <a:spcBef>
+                <a:spcPct val="0"/>
+              </a:spcBef>
+              <a:spcAft>
+                <a:spcPct val="0"/>
+              </a:spcAft>
+              <a:buClrTx/>
+              <a:buSzTx/>
+              <a:buFontTx/>
+              <a:buNone/>
+              <a:tabLst/>
+            </a:pPr>
+            <a:r>
+              <a:rPr kumimoji="0" lang="en-US" altLang="en-US" sz="1400" b="0" i="0" u="none" strike="noStrike" cap="none" normalizeH="0" baseline="0" dirty="0" smtClean="0">
+                <a:ln>
+                  <a:noFill/>
+                </a:ln>
+                <a:solidFill>
+                  <a:srgbClr val="C5C8C6"/>
+                </a:solidFill>
+                <a:effectLst/>
+                <a:latin typeface="Lucida Console" pitchFamily="49" charset="0"/>
+                <a:cs typeface="Arial" pitchFamily="34" charset="0"/>
+              </a:rPr>
+              <a:t>$ </a:t>
+            </a:r>
+            <a:r>
+              <a:rPr kumimoji="0" lang="en-US" altLang="en-US" sz="1400" b="0" i="0" u="none" strike="noStrike" cap="none" normalizeH="0" baseline="0" dirty="0" err="1" smtClean="0">
+                <a:ln>
+                  <a:noFill/>
+                </a:ln>
+                <a:solidFill>
+                  <a:srgbClr val="C5C8C6"/>
+                </a:solidFill>
+                <a:effectLst/>
+                <a:latin typeface="Lucida Console" pitchFamily="49" charset="0"/>
+                <a:cs typeface="Arial" pitchFamily="34" charset="0"/>
+              </a:rPr>
+              <a:t>nreps</a:t>
+            </a:r>
+            <a:r>
+              <a:rPr kumimoji="0" lang="en-US" altLang="en-US" sz="1400" b="0" i="0" u="none" strike="noStrike" cap="none" normalizeH="0" baseline="0" dirty="0" smtClean="0">
+                <a:ln>
+                  <a:noFill/>
+                </a:ln>
+                <a:solidFill>
+                  <a:srgbClr val="C5C8C6"/>
+                </a:solidFill>
+                <a:effectLst/>
+                <a:latin typeface="Lucida Console" pitchFamily="49" charset="0"/>
+                <a:cs typeface="Arial" pitchFamily="34" charset="0"/>
+              </a:rPr>
+              <a:t> : </a:t>
+            </a:r>
+            <a:r>
+              <a:rPr kumimoji="0" lang="en-US" altLang="en-US" sz="1400" b="0" i="0" u="none" strike="noStrike" cap="none" normalizeH="0" baseline="0" dirty="0" err="1" smtClean="0">
+                <a:ln>
+                  <a:noFill/>
+                </a:ln>
+                <a:solidFill>
+                  <a:srgbClr val="C5C8C6"/>
+                </a:solidFill>
+                <a:effectLst/>
+                <a:latin typeface="Lucida Console" pitchFamily="49" charset="0"/>
+                <a:cs typeface="Arial" pitchFamily="34" charset="0"/>
+              </a:rPr>
+              <a:t>int</a:t>
+            </a:r>
+            <a:r>
+              <a:rPr kumimoji="0" lang="en-US" altLang="en-US" sz="1400" b="0" i="0" u="none" strike="noStrike" cap="none" normalizeH="0" baseline="0" dirty="0" smtClean="0">
+                <a:ln>
+                  <a:noFill/>
+                </a:ln>
+                <a:solidFill>
+                  <a:srgbClr val="C5C8C6"/>
+                </a:solidFill>
+                <a:effectLst/>
+                <a:latin typeface="Lucida Console" pitchFamily="49" charset="0"/>
+                <a:cs typeface="Arial" pitchFamily="34" charset="0"/>
+              </a:rPr>
+              <a:t> 10 </a:t>
+            </a:r>
+          </a:p>
+          <a:p>
+            <a:pPr marL="0" marR="0" lvl="0" indent="0" algn="l" defTabSz="914400" rtl="0" eaLnBrk="1" fontAlgn="base" latinLnBrk="0" hangingPunct="1">
+              <a:lnSpc>
+                <a:spcPct val="100000"/>
+              </a:lnSpc>
+              <a:spcBef>
+                <a:spcPct val="0"/>
+              </a:spcBef>
+              <a:spcAft>
+                <a:spcPct val="0"/>
+              </a:spcAft>
+              <a:buClrTx/>
+              <a:buSzTx/>
+              <a:buFontTx/>
+              <a:buNone/>
+              <a:tabLst/>
+            </a:pPr>
+            <a:r>
+              <a:rPr kumimoji="0" lang="en-US" altLang="en-US" sz="1400" b="0" i="0" u="none" strike="noStrike" cap="none" normalizeH="0" baseline="0" dirty="0" smtClean="0">
+                <a:ln>
+                  <a:noFill/>
+                </a:ln>
+                <a:solidFill>
+                  <a:srgbClr val="C5C8C6"/>
+                </a:solidFill>
+                <a:effectLst/>
+                <a:latin typeface="Lucida Console" pitchFamily="49" charset="0"/>
+                <a:cs typeface="Arial" pitchFamily="34" charset="0"/>
+              </a:rPr>
+              <a:t>$ </a:t>
+            </a:r>
+            <a:r>
+              <a:rPr kumimoji="0" lang="en-US" altLang="en-US" sz="1400" b="0" i="0" u="none" strike="noStrike" cap="none" normalizeH="0" baseline="0" dirty="0" err="1" smtClean="0">
+                <a:ln>
+                  <a:noFill/>
+                </a:ln>
+                <a:solidFill>
+                  <a:srgbClr val="C5C8C6"/>
+                </a:solidFill>
+                <a:effectLst/>
+                <a:latin typeface="Lucida Console" pitchFamily="49" charset="0"/>
+                <a:cs typeface="Arial" pitchFamily="34" charset="0"/>
+              </a:rPr>
+              <a:t>segsites</a:t>
+            </a:r>
+            <a:r>
+              <a:rPr kumimoji="0" lang="en-US" altLang="en-US" sz="1400" b="0" i="0" u="none" strike="noStrike" cap="none" normalizeH="0" baseline="0" dirty="0" smtClean="0">
+                <a:ln>
+                  <a:noFill/>
+                </a:ln>
+                <a:solidFill>
+                  <a:srgbClr val="C5C8C6"/>
+                </a:solidFill>
+                <a:effectLst/>
+                <a:latin typeface="Lucida Console" pitchFamily="49" charset="0"/>
+                <a:cs typeface="Arial" pitchFamily="34" charset="0"/>
+              </a:rPr>
+              <a:t> : </a:t>
+            </a:r>
+            <a:r>
+              <a:rPr kumimoji="0" lang="en-US" altLang="en-US" sz="1400" b="0" i="0" u="none" strike="noStrike" cap="none" normalizeH="0" baseline="0" dirty="0" err="1" smtClean="0">
+                <a:ln>
+                  <a:noFill/>
+                </a:ln>
+                <a:solidFill>
+                  <a:srgbClr val="C5C8C6"/>
+                </a:solidFill>
+                <a:effectLst/>
+                <a:latin typeface="Lucida Console" pitchFamily="49" charset="0"/>
+                <a:cs typeface="Arial" pitchFamily="34" charset="0"/>
+              </a:rPr>
+              <a:t>int</a:t>
+            </a:r>
+            <a:r>
+              <a:rPr kumimoji="0" lang="en-US" altLang="en-US" sz="1400" b="0" i="0" u="none" strike="noStrike" cap="none" normalizeH="0" baseline="0" dirty="0" smtClean="0">
+                <a:ln>
+                  <a:noFill/>
+                </a:ln>
+                <a:solidFill>
+                  <a:srgbClr val="C5C8C6"/>
+                </a:solidFill>
+                <a:effectLst/>
+                <a:latin typeface="Lucida Console" pitchFamily="49" charset="0"/>
+                <a:cs typeface="Arial" pitchFamily="34" charset="0"/>
+              </a:rPr>
+              <a:t> [1:10] </a:t>
+            </a:r>
+          </a:p>
+          <a:p>
+            <a:pPr marL="0" marR="0" lvl="0" indent="0" algn="l" defTabSz="914400" rtl="0" eaLnBrk="1" fontAlgn="base" latinLnBrk="0" hangingPunct="1">
+              <a:lnSpc>
+                <a:spcPct val="100000"/>
+              </a:lnSpc>
+              <a:spcBef>
+                <a:spcPct val="0"/>
+              </a:spcBef>
+              <a:spcAft>
+                <a:spcPct val="0"/>
+              </a:spcAft>
+              <a:buClrTx/>
+              <a:buSzTx/>
+              <a:buFontTx/>
+              <a:buNone/>
+              <a:tabLst/>
+            </a:pPr>
+            <a:r>
+              <a:rPr kumimoji="0" lang="en-US" altLang="en-US" sz="1400" b="0" i="0" u="none" strike="noStrike" cap="none" normalizeH="0" baseline="0" dirty="0" smtClean="0">
+                <a:ln>
+                  <a:noFill/>
+                </a:ln>
+                <a:solidFill>
+                  <a:srgbClr val="C5C8C6"/>
+                </a:solidFill>
+                <a:effectLst/>
+                <a:latin typeface="Lucida Console" pitchFamily="49" charset="0"/>
+                <a:cs typeface="Arial" pitchFamily="34" charset="0"/>
+              </a:rPr>
+              <a:t>$ gametes :List of 10</a:t>
+            </a:r>
+            <a:endParaRPr kumimoji="0" lang="en-US" altLang="en-US" sz="2000" b="0" i="0" u="none" strike="noStrike" cap="none" normalizeH="0" baseline="0" dirty="0" smtClean="0">
+              <a:ln>
+                <a:noFill/>
+              </a:ln>
+              <a:solidFill>
+                <a:schemeClr val="tx1"/>
+              </a:solidFill>
+              <a:effectLst/>
+              <a:latin typeface="Arial" pitchFamily="34" charset="0"/>
+              <a:cs typeface="Arial" pitchFamily="34" charset="0"/>
+            </a:endParaRPr>
+          </a:p>
+        </p:txBody>
+      </p:sp>
+      <p:sp>
+        <p:nvSpPr>
+          <p:cNvPr id="6" name="5 CuadroTexto"/>
+          <p:cNvSpPr txBox="1"/>
+          <p:nvPr/>
+        </p:nvSpPr>
+        <p:spPr>
+          <a:xfrm>
+            <a:off x="2195736" y="2204864"/>
+            <a:ext cx="4752528" cy="369332"/>
+          </a:xfrm>
+          <a:prstGeom prst="rect">
+            <a:avLst/>
+          </a:prstGeom>
+          <a:noFill/>
+        </p:spPr>
+        <p:txBody>
+          <a:bodyPr wrap="square" rtlCol="0">
+            <a:spAutoFit/>
+          </a:bodyPr>
+          <a:lstStyle/>
+          <a:p>
+            <a:r>
+              <a:rPr lang="en-US" dirty="0" smtClean="0">
+                <a:solidFill>
+                  <a:schemeClr val="accent1">
+                    <a:lumMod val="75000"/>
+                  </a:schemeClr>
+                </a:solidFill>
+              </a:rPr>
+              <a:t>Input, </a:t>
+            </a:r>
+            <a:r>
+              <a:rPr lang="en-US" dirty="0" err="1" smtClean="0">
+                <a:solidFill>
+                  <a:schemeClr val="accent1">
+                    <a:lumMod val="75000"/>
+                  </a:schemeClr>
+                </a:solidFill>
+              </a:rPr>
+              <a:t>noto</a:t>
+            </a:r>
+            <a:r>
+              <a:rPr lang="en-US" dirty="0" smtClean="0">
+                <a:solidFill>
+                  <a:schemeClr val="accent1">
+                    <a:lumMod val="75000"/>
+                  </a:schemeClr>
+                </a:solidFill>
+              </a:rPr>
+              <a:t> file (19 </a:t>
+            </a:r>
+            <a:r>
+              <a:rPr lang="en-US" dirty="0" err="1" smtClean="0">
+                <a:solidFill>
+                  <a:schemeClr val="accent1">
+                    <a:lumMod val="75000"/>
+                  </a:schemeClr>
+                </a:solidFill>
+              </a:rPr>
+              <a:t>seq</a:t>
+            </a:r>
+            <a:r>
+              <a:rPr lang="en-US" dirty="0" smtClean="0">
+                <a:solidFill>
+                  <a:schemeClr val="accent1">
+                    <a:lumMod val="75000"/>
+                  </a:schemeClr>
+                </a:solidFill>
+              </a:rPr>
+              <a:t>) with niter=10</a:t>
+            </a:r>
+            <a:endParaRPr lang="en-US" dirty="0">
+              <a:solidFill>
+                <a:schemeClr val="accent1">
+                  <a:lumMod val="75000"/>
+                </a:schemeClr>
+              </a:solidFill>
+            </a:endParaRPr>
+          </a:p>
+        </p:txBody>
+      </p:sp>
+    </p:spTree>
+    <p:extLst>
+      <p:ext uri="{BB962C8B-B14F-4D97-AF65-F5344CB8AC3E}">
+        <p14:creationId xmlns:p14="http://schemas.microsoft.com/office/powerpoint/2010/main" val="1013572167"/>
       </p:ext>
     </p:extLst>
   </p:cSld>

</xml_diff>